<commit_message>
Minor updates to src0.
</commit_message>
<xml_diff>
--- a/PowerPoint Slides/05 - Lexical Analysis.pptx
+++ b/PowerPoint Slides/05 - Lexical Analysis.pptx
@@ -14536,7 +14536,7 @@
               <a:rPr lang="en-US" sz="1800" dirty="0">
                 <a:latin typeface="Consolas" pitchFamily="49" charset="0"/>
               </a:rPr>
-              <a:t>p   Line 1, Character 1</a:t>
+              <a:t>p   line 1, character 1</a:t>
             </a:r>
           </a:p>
           <a:p>
@@ -14551,7 +14551,7 @@
               <a:rPr lang="en-US" sz="1800" dirty="0">
                 <a:latin typeface="Consolas" pitchFamily="49" charset="0"/>
               </a:rPr>
-              <a:t>a   Line 1, Character 2</a:t>
+              <a:t>a   line 1, character 2</a:t>
             </a:r>
           </a:p>
           <a:p>
@@ -14566,7 +14566,7 @@
               <a:rPr lang="en-US" sz="1800" dirty="0">
                 <a:latin typeface="Consolas" pitchFamily="49" charset="0"/>
               </a:rPr>
-              <a:t>c   Line 1, Character 3</a:t>
+              <a:t>c   line 1, character 3</a:t>
             </a:r>
           </a:p>
           <a:p>
@@ -14581,7 +14581,7 @@
               <a:rPr lang="en-US" sz="1800" dirty="0">
                 <a:latin typeface="Consolas" pitchFamily="49" charset="0"/>
               </a:rPr>
-              <a:t>k   Line 1, Character 4</a:t>
+              <a:t>k   line 1, character 4</a:t>
             </a:r>
           </a:p>
           <a:p>
@@ -14596,7 +14596,7 @@
               <a:rPr lang="en-US" sz="1800" dirty="0">
                 <a:latin typeface="Consolas" pitchFamily="49" charset="0"/>
               </a:rPr>
-              <a:t>a   Line 1, Character 5</a:t>
+              <a:t>a   line 1, character 5</a:t>
             </a:r>
           </a:p>
           <a:p>
@@ -14611,7 +14611,7 @@
               <a:rPr lang="en-US" sz="1800" dirty="0">
                 <a:latin typeface="Consolas" pitchFamily="49" charset="0"/>
               </a:rPr>
-              <a:t>g   Line 1, Character 6</a:t>
+              <a:t>g   line 1, character 6</a:t>
             </a:r>
           </a:p>
           <a:p>
@@ -14626,7 +14626,7 @@
               <a:rPr lang="en-US" sz="1800" dirty="0">
                 <a:latin typeface="Consolas" pitchFamily="49" charset="0"/>
               </a:rPr>
-              <a:t>e   Line 1, Character 7</a:t>
+              <a:t>e   line 1, character 7</a:t>
             </a:r>
           </a:p>
           <a:p>
@@ -14641,7 +14641,7 @@
               <a:rPr lang="en-US" sz="1800" dirty="0">
                 <a:latin typeface="Consolas" pitchFamily="49" charset="0"/>
               </a:rPr>
-              <a:t>    Line 1, Character 8</a:t>
+              <a:t>    line 1, character 8</a:t>
             </a:r>
           </a:p>
           <a:p>
@@ -14656,7 +14656,7 @@
               <a:rPr lang="en-US" sz="1800" dirty="0">
                 <a:latin typeface="Consolas" pitchFamily="49" charset="0"/>
               </a:rPr>
-              <a:t>e   Line 1, Character 9</a:t>
+              <a:t>e   line 1, character 9</a:t>
             </a:r>
           </a:p>
           <a:p>
@@ -14671,7 +14671,7 @@
               <a:rPr lang="en-US" sz="1800" dirty="0">
                 <a:latin typeface="Consolas" pitchFamily="49" charset="0"/>
               </a:rPr>
-              <a:t>d   Line 1, Character 10</a:t>
+              <a:t>d   line 1, character 10</a:t>
             </a:r>
           </a:p>
           <a:p>
@@ -14686,7 +14686,7 @@
               <a:rPr lang="en-US" sz="1800" dirty="0">
                 <a:latin typeface="Consolas" pitchFamily="49" charset="0"/>
               </a:rPr>
-              <a:t>u   Line 1, Character 11</a:t>
+              <a:t>u   line 1, character 11</a:t>
             </a:r>
           </a:p>
           <a:p>
@@ -14701,7 +14701,7 @@
               <a:rPr lang="en-US" sz="1800" dirty="0">
                 <a:latin typeface="Consolas" pitchFamily="49" charset="0"/>
               </a:rPr>
-              <a:t>.   Line 1, Character 12</a:t>
+              <a:t>.   line 1, character 12</a:t>
             </a:r>
           </a:p>
           <a:p>
@@ -14716,7 +14716,7 @@
               <a:rPr lang="en-US" sz="1800" dirty="0">
                 <a:latin typeface="Consolas" pitchFamily="49" charset="0"/>
               </a:rPr>
-              <a:t>c   Line 1, Character 13</a:t>
+              <a:t>c   line 1, character 13</a:t>
             </a:r>
           </a:p>
           <a:p>
@@ -14728,10 +14728,16 @@
               <a:buNone/>
             </a:pPr>
             <a:r>
-              <a:rPr lang="en-US" sz="1800" dirty="0">
-                <a:latin typeface="Consolas" pitchFamily="49" charset="0"/>
-              </a:rPr>
-              <a:t>i   Line 1, Character 14</a:t>
+              <a:rPr lang="en-US" sz="1800" dirty="0" err="1">
+                <a:latin typeface="Consolas" pitchFamily="49" charset="0"/>
+              </a:rPr>
+              <a:t>i</a:t>
+            </a:r>
+            <a:r>
+              <a:rPr lang="en-US" sz="1800" dirty="0">
+                <a:latin typeface="Consolas" pitchFamily="49" charset="0"/>
+              </a:rPr>
+              <a:t>   line 1, character 14</a:t>
             </a:r>
           </a:p>
           <a:p>
@@ -14746,7 +14752,7 @@
               <a:rPr lang="en-US" sz="1800" dirty="0">
                 <a:latin typeface="Consolas" pitchFamily="49" charset="0"/>
               </a:rPr>
-              <a:t>t   Line 1, Character 15</a:t>
+              <a:t>t   line 1, character 15</a:t>
             </a:r>
           </a:p>
           <a:p>
@@ -14761,7 +14767,7 @@
               <a:rPr lang="en-US" sz="1800" dirty="0">
                 <a:latin typeface="Consolas" pitchFamily="49" charset="0"/>
               </a:rPr>
-              <a:t>a   Line 1, Character 16</a:t>
+              <a:t>a   line 1, character 16</a:t>
             </a:r>
           </a:p>
           <a:p>
@@ -14824,8 +14830,16 @@
           <a:lstStyle/>
           <a:p>
             <a:r>
-              <a:rPr lang="en-US"/>
-              <a:t>©SoftMoore Consulting</a:t>
+              <a:rPr lang="en-US" dirty="0"/>
+              <a:t>©</a:t>
+            </a:r>
+            <a:r>
+              <a:rPr lang="en-US" dirty="0" err="1"/>
+              <a:t>SoftMoore</a:t>
+            </a:r>
+            <a:r>
+              <a:rPr lang="en-US" dirty="0"/>
+              <a:t> Consulting</a:t>
             </a:r>
           </a:p>
         </p:txBody>

</xml_diff>

<commit_message>
resynchronized slides and source code
</commit_message>
<xml_diff>
--- a/PowerPoint Slides/05 - Lexical Analysis.pptx
+++ b/PowerPoint Slides/05 - Lexical Analysis.pptx
@@ -183,12 +183,12 @@
     </p:ext>
     <p:ext uri="{2D200454-40CA-4A62-9FC3-DE9A4176ACB9}">
       <p15:notesGuideLst xmlns:p15="http://schemas.microsoft.com/office/powerpoint/2012/main">
-        <p15:guide id="1" orient="horz" pos="2929">
+        <p15:guide id="1" orient="horz" pos="2929" userDrawn="1">
           <p15:clr>
             <a:srgbClr val="A4A3A4"/>
           </p15:clr>
         </p15:guide>
-        <p15:guide id="2" pos="2208">
+        <p15:guide id="2" pos="2208" userDrawn="1">
           <p15:clr>
             <a:srgbClr val="A4A3A4"/>
           </p15:clr>
@@ -252,13 +252,13 @@
           <a:effectLst/>
         </p:spPr>
         <p:txBody>
-          <a:bodyPr vert="horz" wrap="square" lIns="93165" tIns="46584" rIns="93165" bIns="46584" numCol="1" anchor="t" anchorCtr="0" compatLnSpc="1">
+          <a:bodyPr vert="horz" wrap="square" lIns="93151" tIns="46578" rIns="93151" bIns="46578" numCol="1" anchor="t" anchorCtr="0" compatLnSpc="1">
             <a:prstTxWarp prst="textNoShape">
               <a:avLst/>
             </a:prstTxWarp>
           </a:bodyPr>
           <a:lstStyle>
-            <a:lvl1pPr algn="r" defTabSz="931708">
+            <a:lvl1pPr algn="r" defTabSz="931572">
               <a:defRPr sz="1200"/>
             </a:lvl1pPr>
           </a:lstStyle>
@@ -303,13 +303,13 @@
           <a:effectLst/>
         </p:spPr>
         <p:txBody>
-          <a:bodyPr vert="horz" wrap="square" lIns="93165" tIns="46584" rIns="93165" bIns="46584" numCol="1" anchor="b" anchorCtr="0" compatLnSpc="1">
+          <a:bodyPr vert="horz" wrap="square" lIns="93151" tIns="46578" rIns="93151" bIns="46578" numCol="1" anchor="b" anchorCtr="0" compatLnSpc="1">
             <a:prstTxWarp prst="textNoShape">
               <a:avLst/>
             </a:prstTxWarp>
           </a:bodyPr>
           <a:lstStyle>
-            <a:lvl1pPr algn="r" defTabSz="931708">
+            <a:lvl1pPr algn="r" defTabSz="931572">
               <a:defRPr sz="1200"/>
             </a:lvl1pPr>
           </a:lstStyle>
@@ -402,13 +402,13 @@
           <a:effectLst/>
         </p:spPr>
         <p:txBody>
-          <a:bodyPr vert="horz" wrap="square" lIns="93165" tIns="46584" rIns="93165" bIns="46584" numCol="1" anchor="t" anchorCtr="0" compatLnSpc="1">
+          <a:bodyPr vert="horz" wrap="square" lIns="93151" tIns="46578" rIns="93151" bIns="46578" numCol="1" anchor="t" anchorCtr="0" compatLnSpc="1">
             <a:prstTxWarp prst="textNoShape">
               <a:avLst/>
             </a:prstTxWarp>
           </a:bodyPr>
           <a:lstStyle>
-            <a:lvl1pPr algn="l" defTabSz="931708">
+            <a:lvl1pPr algn="l" defTabSz="931572">
               <a:defRPr sz="1200"/>
             </a:lvl1pPr>
           </a:lstStyle>
@@ -451,13 +451,13 @@
           <a:effectLst/>
         </p:spPr>
         <p:txBody>
-          <a:bodyPr vert="horz" wrap="square" lIns="93165" tIns="46584" rIns="93165" bIns="46584" numCol="1" anchor="t" anchorCtr="0" compatLnSpc="1">
+          <a:bodyPr vert="horz" wrap="square" lIns="93151" tIns="46578" rIns="93151" bIns="46578" numCol="1" anchor="t" anchorCtr="0" compatLnSpc="1">
             <a:prstTxWarp prst="textNoShape">
               <a:avLst/>
             </a:prstTxWarp>
           </a:bodyPr>
           <a:lstStyle>
-            <a:lvl1pPr algn="r" defTabSz="931708">
+            <a:lvl1pPr algn="r" defTabSz="931572">
               <a:defRPr sz="1200"/>
             </a:lvl1pPr>
           </a:lstStyle>
@@ -481,8 +481,8 @@
         </p:nvSpPr>
         <p:spPr bwMode="auto">
           <a:xfrm>
-            <a:off x="1181100" y="696913"/>
-            <a:ext cx="4649788" cy="3486150"/>
+            <a:off x="1182688" y="696913"/>
+            <a:ext cx="4646612" cy="3486150"/>
           </a:xfrm>
           <a:prstGeom prst="rect">
             <a:avLst/>
@@ -510,7 +510,7 @@
         </p:nvSpPr>
         <p:spPr bwMode="auto">
           <a:xfrm>
-            <a:off x="934720" y="4415911"/>
+            <a:off x="934720" y="4415912"/>
             <a:ext cx="5140960" cy="4182813"/>
           </a:xfrm>
           <a:prstGeom prst="rect">
@@ -526,7 +526,7 @@
           <a:effectLst/>
         </p:spPr>
         <p:txBody>
-          <a:bodyPr vert="horz" wrap="square" lIns="93165" tIns="46584" rIns="93165" bIns="46584" numCol="1" anchor="t" anchorCtr="0" compatLnSpc="1">
+          <a:bodyPr vert="horz" wrap="square" lIns="93151" tIns="46578" rIns="93151" bIns="46578" numCol="1" anchor="t" anchorCtr="0" compatLnSpc="1">
             <a:prstTxWarp prst="textNoShape">
               <a:avLst/>
             </a:prstTxWarp>
@@ -597,13 +597,13 @@
           <a:effectLst/>
         </p:spPr>
         <p:txBody>
-          <a:bodyPr vert="horz" wrap="square" lIns="93165" tIns="46584" rIns="93165" bIns="46584" numCol="1" anchor="b" anchorCtr="0" compatLnSpc="1">
+          <a:bodyPr vert="horz" wrap="square" lIns="93151" tIns="46578" rIns="93151" bIns="46578" numCol="1" anchor="b" anchorCtr="0" compatLnSpc="1">
             <a:prstTxWarp prst="textNoShape">
               <a:avLst/>
             </a:prstTxWarp>
           </a:bodyPr>
           <a:lstStyle>
-            <a:lvl1pPr algn="l" defTabSz="931708">
+            <a:lvl1pPr algn="l" defTabSz="931572">
               <a:defRPr sz="1200"/>
             </a:lvl1pPr>
           </a:lstStyle>
@@ -643,13 +643,13 @@
           <a:effectLst/>
         </p:spPr>
         <p:txBody>
-          <a:bodyPr vert="horz" wrap="square" lIns="93165" tIns="46584" rIns="93165" bIns="46584" numCol="1" anchor="b" anchorCtr="0" compatLnSpc="1">
+          <a:bodyPr vert="horz" wrap="square" lIns="93151" tIns="46578" rIns="93151" bIns="46578" numCol="1" anchor="b" anchorCtr="0" compatLnSpc="1">
             <a:prstTxWarp prst="textNoShape">
               <a:avLst/>
             </a:prstTxWarp>
           </a:bodyPr>
           <a:lstStyle>
-            <a:lvl1pPr algn="r" defTabSz="931708">
+            <a:lvl1pPr algn="r" defTabSz="931572">
               <a:defRPr sz="1200"/>
             </a:lvl1pPr>
           </a:lstStyle>
@@ -6635,15 +6635,7 @@
             </a:r>
             <a:r>
               <a:rPr lang="en-US" dirty="0"/>
-              <a:t> </a:t>
-            </a:r>
-            <a:r>
-              <a:rPr lang="en-US" dirty="0" err="1"/>
-              <a:t>enum</a:t>
-            </a:r>
-            <a:r>
-              <a:rPr lang="en-US" dirty="0"/>
-              <a:t> class</a:t>
+              <a:t> enum class</a:t>
             </a:r>
           </a:p>
           <a:p>
@@ -6695,19 +6687,7 @@
               <a:rPr lang="en-US" sz="1800" dirty="0">
                 <a:latin typeface="Consolas" panose="020B0609020204030204" pitchFamily="49" charset="0"/>
               </a:rPr>
-              <a:t>public class Token extends </a:t>
-            </a:r>
-            <a:r>
-              <a:rPr lang="en-US" sz="1800" dirty="0" err="1">
-                <a:latin typeface="Consolas" panose="020B0609020204030204" pitchFamily="49" charset="0"/>
-              </a:rPr>
-              <a:t>AbstractToken</a:t>
-            </a:r>
-            <a:r>
-              <a:rPr lang="en-US" sz="1800" dirty="0">
-                <a:latin typeface="Consolas" panose="020B0609020204030204" pitchFamily="49" charset="0"/>
-              </a:rPr>
-              <a:t>&lt;Symbol&gt;</a:t>
+              <a:t>public class Token extends AbstractToken&lt;Symbol&gt;</a:t>
             </a:r>
           </a:p>
           <a:p>
@@ -6809,7 +6789,7 @@
               <a:t>Class </a:t>
             </a:r>
             <a:r>
-              <a:rPr lang="en-US" dirty="0" err="1">
+              <a:rPr lang="en-US" dirty="0">
                 <a:latin typeface="Consolas" panose="020B0609020204030204" pitchFamily="49" charset="0"/>
               </a:rPr>
               <a:t>AbstractToken</a:t>
@@ -8317,58 +8297,46 @@
               <a:rPr lang="en-US" sz="1800" dirty="0">
                 <a:latin typeface="Consolas" pitchFamily="49" charset="0"/>
               </a:rPr>
+              <a:t>    position = </a:t>
+            </a:r>
+            <a:r>
+              <a:rPr lang="en-US" sz="1800" dirty="0" err="1">
+                <a:latin typeface="Consolas" pitchFamily="49" charset="0"/>
+              </a:rPr>
+              <a:t>source.getCharPosition</a:t>
+            </a:r>
+            <a:r>
+              <a:rPr lang="en-US" sz="1800" dirty="0">
+                <a:latin typeface="Consolas" pitchFamily="49" charset="0"/>
+              </a:rPr>
+              <a:t>();</a:t>
+            </a:r>
+          </a:p>
+          <a:p>
+            <a:pPr marL="0" indent="0">
+              <a:spcBef>
+                <a:spcPts val="100"/>
+              </a:spcBef>
+              <a:buFontTx/>
+              <a:buNone/>
+            </a:pPr>
+            <a:r>
+              <a:rPr lang="en-US" sz="1800" dirty="0">
+                <a:latin typeface="Consolas" pitchFamily="49" charset="0"/>
+              </a:rPr>
               <a:t>    </a:t>
             </a:r>
             <a:r>
               <a:rPr lang="en-US" sz="1800" dirty="0" err="1">
                 <a:latin typeface="Consolas" pitchFamily="49" charset="0"/>
               </a:rPr>
-              <a:t>currentToken.setPosition</a:t>
-            </a:r>
-            <a:r>
-              <a:rPr lang="en-US" sz="1800" dirty="0">
-                <a:latin typeface="Consolas" pitchFamily="49" charset="0"/>
-              </a:rPr>
-              <a:t>(</a:t>
-            </a:r>
-            <a:r>
-              <a:rPr lang="en-US" sz="1800" dirty="0" err="1">
-                <a:latin typeface="Consolas" pitchFamily="49" charset="0"/>
-              </a:rPr>
-              <a:t>source.getCharPosition</a:t>
-            </a:r>
-            <a:r>
-              <a:rPr lang="en-US" sz="1800" dirty="0">
-                <a:latin typeface="Consolas" pitchFamily="49" charset="0"/>
-              </a:rPr>
-              <a:t>());</a:t>
-            </a:r>
-          </a:p>
-          <a:p>
-            <a:pPr marL="0" indent="0">
-              <a:spcBef>
-                <a:spcPts val="100"/>
-              </a:spcBef>
-              <a:buFontTx/>
-              <a:buNone/>
-            </a:pPr>
-            <a:r>
-              <a:rPr lang="en-US" sz="1800" dirty="0">
-                <a:latin typeface="Consolas" pitchFamily="49" charset="0"/>
-              </a:rPr>
-              <a:t>    </a:t>
-            </a:r>
-            <a:r>
-              <a:rPr lang="en-US" sz="1800" dirty="0" err="1">
-                <a:latin typeface="Consolas" pitchFamily="49" charset="0"/>
-              </a:rPr>
-              <a:t>currentToken.setText</a:t>
-            </a:r>
-            <a:r>
-              <a:rPr lang="en-US" sz="1800" dirty="0">
-                <a:latin typeface="Consolas" pitchFamily="49" charset="0"/>
-              </a:rPr>
-              <a:t>(null);</a:t>
+              <a:t>textm</a:t>
+            </a:r>
+            <a:r>
+              <a:rPr lang="en-US" sz="1800" dirty="0">
+                <a:latin typeface="Consolas" pitchFamily="49" charset="0"/>
+              </a:rPr>
+              <a:t>= null;</a:t>
             </a:r>
           </a:p>
           <a:p>
@@ -8772,76 +8740,25 @@
               <a:rPr lang="en-US" sz="1800" dirty="0">
                 <a:latin typeface="Consolas" pitchFamily="49" charset="0"/>
               </a:rPr>
-              <a:t>        Symbol </a:t>
+              <a:t>        symbol = </a:t>
             </a:r>
             <a:r>
               <a:rPr lang="en-US" sz="1800" dirty="0" err="1">
                 <a:latin typeface="Consolas" pitchFamily="49" charset="0"/>
               </a:rPr>
-              <a:t>scannedSymbol</a:t>
-            </a:r>
-            <a:r>
-              <a:rPr lang="en-US" sz="1800" dirty="0">
-                <a:latin typeface="Consolas" pitchFamily="49" charset="0"/>
-              </a:rPr>
-              <a:t> = </a:t>
+              <a:t>getIdentifierSymbol</a:t>
+            </a:r>
+            <a:r>
+              <a:rPr lang="en-US" sz="1800" dirty="0">
+                <a:latin typeface="Consolas" pitchFamily="49" charset="0"/>
+              </a:rPr>
+              <a:t>(</a:t>
             </a:r>
             <a:r>
               <a:rPr lang="en-US" sz="1800" dirty="0" err="1">
                 <a:latin typeface="Consolas" pitchFamily="49" charset="0"/>
               </a:rPr>
-              <a:t>getIdentifierSymbol</a:t>
-            </a:r>
-            <a:r>
-              <a:rPr lang="en-US" sz="1800" dirty="0">
-                <a:latin typeface="Consolas" pitchFamily="49" charset="0"/>
-              </a:rPr>
-              <a:t>(</a:t>
-            </a:r>
-            <a:r>
-              <a:rPr lang="en-US" sz="1800" dirty="0" err="1">
-                <a:latin typeface="Consolas" pitchFamily="49" charset="0"/>
-              </a:rPr>
               <a:t>idString</a:t>
-            </a:r>
-            <a:r>
-              <a:rPr lang="en-US" sz="1800" dirty="0">
-                <a:latin typeface="Consolas" pitchFamily="49" charset="0"/>
-              </a:rPr>
-              <a:t>);</a:t>
-            </a:r>
-          </a:p>
-          <a:p>
-            <a:pPr marL="0" indent="0">
-              <a:spcBef>
-                <a:spcPts val="0"/>
-              </a:spcBef>
-              <a:buFontTx/>
-              <a:buNone/>
-            </a:pPr>
-            <a:r>
-              <a:rPr lang="en-US" sz="1800" dirty="0">
-                <a:latin typeface="Consolas" pitchFamily="49" charset="0"/>
-              </a:rPr>
-              <a:t>        </a:t>
-            </a:r>
-            <a:r>
-              <a:rPr lang="en-US" sz="1800" dirty="0" err="1">
-                <a:latin typeface="Consolas" pitchFamily="49" charset="0"/>
-              </a:rPr>
-              <a:t>currentToken.setSymbol</a:t>
-            </a:r>
-            <a:r>
-              <a:rPr lang="en-US" sz="1800" dirty="0">
-                <a:latin typeface="Consolas" pitchFamily="49" charset="0"/>
-              </a:rPr>
-              <a:t>(</a:t>
-            </a:r>
-            <a:r>
-              <a:rPr lang="en-US" sz="1800" dirty="0" err="1">
-                <a:latin typeface="Consolas" pitchFamily="49" charset="0"/>
-              </a:rPr>
-              <a:t>scannedSymbol</a:t>
             </a:r>
             <a:r>
               <a:rPr lang="en-US" sz="1800" dirty="0">
@@ -8874,31 +8791,46 @@
               <a:rPr lang="en-US" sz="1800" dirty="0">
                 <a:latin typeface="Consolas" pitchFamily="49" charset="0"/>
               </a:rPr>
-              <a:t>        if (</a:t>
+              <a:t>        if (symbol == </a:t>
             </a:r>
             <a:r>
               <a:rPr lang="en-US" sz="1800" dirty="0" err="1">
                 <a:latin typeface="Consolas" pitchFamily="49" charset="0"/>
               </a:rPr>
-              <a:t>scannedSymbol</a:t>
-            </a:r>
-            <a:r>
-              <a:rPr lang="en-US" sz="1800" dirty="0">
-                <a:latin typeface="Consolas" pitchFamily="49" charset="0"/>
-              </a:rPr>
-              <a:t> == </a:t>
+              <a:t>Symbol.identifier</a:t>
+            </a:r>
+            <a:r>
+              <a:rPr lang="en-US" sz="1800" dirty="0">
+                <a:latin typeface="Consolas" pitchFamily="49" charset="0"/>
+              </a:rPr>
+              <a:t>)</a:t>
+            </a:r>
+          </a:p>
+          <a:p>
+            <a:pPr marL="0" indent="0">
+              <a:spcBef>
+                <a:spcPts val="0"/>
+              </a:spcBef>
+              <a:buFontTx/>
+              <a:buNone/>
+            </a:pPr>
+            <a:r>
+              <a:rPr lang="en-US" sz="1800" dirty="0">
+                <a:latin typeface="Consolas" pitchFamily="49" charset="0"/>
+              </a:rPr>
+              <a:t>            text = </a:t>
             </a:r>
             <a:r>
               <a:rPr lang="en-US" sz="1800" dirty="0" err="1">
                 <a:latin typeface="Consolas" pitchFamily="49" charset="0"/>
               </a:rPr>
-              <a:t>Symbol.identifier</a:t>
-            </a:r>
-            <a:r>
-              <a:rPr lang="en-US" sz="1800" dirty="0">
-                <a:latin typeface="Consolas" pitchFamily="49" charset="0"/>
-              </a:rPr>
-              <a:t>)</a:t>
+              <a:t>idString</a:t>
+            </a:r>
+            <a:r>
+              <a:rPr lang="en-US" sz="1800" dirty="0">
+                <a:latin typeface="Consolas" pitchFamily="49" charset="0"/>
+              </a:rPr>
+              <a:t>;</a:t>
             </a:r>
           </a:p>
           <a:p>
@@ -8913,31 +8845,46 @@
               <a:rPr lang="en-US" sz="1800" dirty="0">
                 <a:latin typeface="Consolas" pitchFamily="49" charset="0"/>
               </a:rPr>
-              <a:t>            </a:t>
+              <a:t>      }</a:t>
+            </a:r>
+          </a:p>
+          <a:p>
+            <a:pPr marL="0" indent="0">
+              <a:spcBef>
+                <a:spcPts val="0"/>
+              </a:spcBef>
+              <a:buFontTx/>
+              <a:buNone/>
+            </a:pPr>
+            <a:r>
+              <a:rPr lang="en-US" sz="1800" dirty="0">
+                <a:latin typeface="Consolas" pitchFamily="49" charset="0"/>
+              </a:rPr>
+              <a:t>    else if (</a:t>
             </a:r>
             <a:r>
               <a:rPr lang="en-US" sz="1800" dirty="0" err="1">
                 <a:latin typeface="Consolas" pitchFamily="49" charset="0"/>
               </a:rPr>
-              <a:t>currentToken.setText</a:t>
-            </a:r>
-            <a:r>
-              <a:rPr lang="en-US" sz="1800" dirty="0">
-                <a:latin typeface="Consolas" pitchFamily="49" charset="0"/>
-              </a:rPr>
-              <a:t>(</a:t>
+              <a:t>Character.isDigit</a:t>
+            </a:r>
+            <a:r>
+              <a:rPr lang="en-US" sz="1800" dirty="0">
+                <a:latin typeface="Consolas" pitchFamily="49" charset="0"/>
+              </a:rPr>
+              <a:t>((char) </a:t>
             </a:r>
             <a:r>
               <a:rPr lang="en-US" sz="1800" dirty="0" err="1">
                 <a:latin typeface="Consolas" pitchFamily="49" charset="0"/>
               </a:rPr>
-              <a:t>idString</a:t>
-            </a:r>
-            <a:r>
-              <a:rPr lang="en-US" sz="1800" dirty="0">
-                <a:latin typeface="Consolas" pitchFamily="49" charset="0"/>
-              </a:rPr>
-              <a:t>);</a:t>
+              <a:t>source.getChar</a:t>
+            </a:r>
+            <a:r>
+              <a:rPr lang="en-US" sz="1800" dirty="0">
+                <a:latin typeface="Consolas" pitchFamily="49" charset="0"/>
+              </a:rPr>
+              <a:t>()))</a:t>
             </a:r>
           </a:p>
           <a:p>
@@ -8952,7 +8899,7 @@
               <a:rPr lang="en-US" sz="1800" dirty="0">
                 <a:latin typeface="Consolas" pitchFamily="49" charset="0"/>
               </a:rPr>
-              <a:t>      }</a:t>
+              <a:t>      {</a:t>
             </a:r>
           </a:p>
           <a:p>
@@ -8964,34 +8911,10 @@
               <a:buNone/>
             </a:pPr>
             <a:r>
-              <a:rPr lang="en-US" sz="1800" dirty="0">
-                <a:latin typeface="Consolas" pitchFamily="49" charset="0"/>
-              </a:rPr>
-              <a:t>    else if (</a:t>
-            </a:r>
-            <a:r>
-              <a:rPr lang="en-US" sz="1800" dirty="0" err="1">
-                <a:latin typeface="Consolas" pitchFamily="49" charset="0"/>
-              </a:rPr>
-              <a:t>Character.isDigit</a:t>
-            </a:r>
-            <a:r>
-              <a:rPr lang="en-US" sz="1800" dirty="0">
-                <a:latin typeface="Consolas" pitchFamily="49" charset="0"/>
-              </a:rPr>
-              <a:t>((char) </a:t>
-            </a:r>
-            <a:r>
-              <a:rPr lang="en-US" sz="1800" dirty="0" err="1">
-                <a:latin typeface="Consolas" pitchFamily="49" charset="0"/>
-              </a:rPr>
-              <a:t>source.getChar</a:t>
-            </a:r>
-            <a:r>
-              <a:rPr lang="en-US" sz="1800" dirty="0">
-                <a:latin typeface="Consolas" pitchFamily="49" charset="0"/>
-              </a:rPr>
-              <a:t>()))</a:t>
+              <a:rPr lang="sv-SE" sz="1800" dirty="0">
+                <a:latin typeface="Consolas" pitchFamily="49" charset="0"/>
+              </a:rPr>
+              <a:t>        text   = scanIntegerLiteral();</a:t>
             </a:r>
           </a:p>
           <a:p>
@@ -9003,88 +8926,10 @@
               <a:buNone/>
             </a:pPr>
             <a:r>
-              <a:rPr lang="en-US" sz="1800" dirty="0">
-                <a:latin typeface="Consolas" pitchFamily="49" charset="0"/>
-              </a:rPr>
-              <a:t>      {</a:t>
-            </a:r>
-          </a:p>
-          <a:p>
-            <a:pPr marL="0" indent="0">
-              <a:spcBef>
-                <a:spcPts val="0"/>
-              </a:spcBef>
-              <a:buFontTx/>
-              <a:buNone/>
-            </a:pPr>
-            <a:r>
-              <a:rPr lang="en-US" sz="1800" dirty="0">
-                <a:latin typeface="Consolas" pitchFamily="49" charset="0"/>
-              </a:rPr>
-              <a:t>        </a:t>
-            </a:r>
-            <a:r>
-              <a:rPr lang="en-US" sz="1800" dirty="0" err="1">
-                <a:latin typeface="Consolas" pitchFamily="49" charset="0"/>
-              </a:rPr>
-              <a:t>currentToken.setText</a:t>
-            </a:r>
-            <a:r>
-              <a:rPr lang="en-US" sz="1800" dirty="0">
-                <a:latin typeface="Consolas" pitchFamily="49" charset="0"/>
-              </a:rPr>
-              <a:t>(</a:t>
-            </a:r>
-            <a:r>
-              <a:rPr lang="en-US" sz="1800" dirty="0" err="1">
-                <a:latin typeface="Consolas" pitchFamily="49" charset="0"/>
-              </a:rPr>
-              <a:t>scanIntegerLiteral</a:t>
-            </a:r>
-            <a:r>
-              <a:rPr lang="en-US" sz="1800" dirty="0">
-                <a:latin typeface="Consolas" pitchFamily="49" charset="0"/>
-              </a:rPr>
-              <a:t>());</a:t>
-            </a:r>
-          </a:p>
-          <a:p>
-            <a:pPr marL="0" indent="0">
-              <a:spcBef>
-                <a:spcPts val="0"/>
-              </a:spcBef>
-              <a:buFontTx/>
-              <a:buNone/>
-            </a:pPr>
-            <a:r>
-              <a:rPr lang="en-US" sz="1800" dirty="0">
-                <a:latin typeface="Consolas" pitchFamily="49" charset="0"/>
-              </a:rPr>
-              <a:t>        </a:t>
-            </a:r>
-            <a:r>
-              <a:rPr lang="en-US" sz="1800" dirty="0" err="1">
-                <a:latin typeface="Consolas" pitchFamily="49" charset="0"/>
-              </a:rPr>
-              <a:t>currentToken.setSymbol</a:t>
-            </a:r>
-            <a:r>
-              <a:rPr lang="en-US" sz="1800" dirty="0">
-                <a:latin typeface="Consolas" pitchFamily="49" charset="0"/>
-              </a:rPr>
-              <a:t>(</a:t>
-            </a:r>
-            <a:r>
-              <a:rPr lang="en-US" sz="1800" dirty="0" err="1">
-                <a:latin typeface="Consolas" pitchFamily="49" charset="0"/>
-              </a:rPr>
-              <a:t>Symbol.intLiteral</a:t>
-            </a:r>
-            <a:r>
-              <a:rPr lang="en-US" sz="1800" dirty="0">
-                <a:latin typeface="Consolas" pitchFamily="49" charset="0"/>
-              </a:rPr>
-              <a:t>);</a:t>
+              <a:rPr lang="sv-SE" sz="1800" dirty="0">
+                <a:latin typeface="Consolas" pitchFamily="49" charset="0"/>
+              </a:rPr>
+              <a:t>        symbol = Symbol.intLiteral;</a:t>
             </a:r>
           </a:p>
           <a:p>
@@ -10406,6 +10251,10 @@
           </p:nvPr>
         </p:nvSpPr>
         <p:spPr>
+          <a:xfrm>
+            <a:off x="458788" y="1363663"/>
+            <a:ext cx="8321040" cy="4935537"/>
+          </a:xfrm>
           <a:noFill/>
         </p:spPr>
         <p:txBody>
@@ -10474,7 +10323,19 @@
               <a:rPr lang="en-US" sz="1800" dirty="0">
                 <a:latin typeface="Consolas" pitchFamily="49" charset="0"/>
               </a:rPr>
-              <a:t>    // assumes that source.getChar() is the first</a:t>
+              <a:t>    // assumes that </a:t>
+            </a:r>
+            <a:r>
+              <a:rPr lang="en-US" sz="1800" dirty="0" err="1">
+                <a:latin typeface="Consolas" pitchFamily="49" charset="0"/>
+              </a:rPr>
+              <a:t>source.getChar</a:t>
+            </a:r>
+            <a:r>
+              <a:rPr lang="en-US" sz="1800" dirty="0">
+                <a:latin typeface="Consolas" pitchFamily="49" charset="0"/>
+              </a:rPr>
+              <a:t>() is the first digit</a:t>
             </a:r>
           </a:p>
           <a:p>
@@ -10489,7 +10350,46 @@
               <a:rPr lang="en-US" sz="1800" dirty="0">
                 <a:latin typeface="Consolas" pitchFamily="49" charset="0"/>
               </a:rPr>
-              <a:t>    // digit of the integer literal</a:t>
+              <a:t>    // of the integer literal</a:t>
+            </a:r>
+          </a:p>
+          <a:p>
+            <a:pPr marL="0" indent="0">
+              <a:spcBef>
+                <a:spcPts val="100"/>
+              </a:spcBef>
+              <a:buFontTx/>
+              <a:buNone/>
+            </a:pPr>
+            <a:r>
+              <a:rPr lang="en-US" sz="1800" dirty="0">
+                <a:latin typeface="Consolas" pitchFamily="49" charset="0"/>
+              </a:rPr>
+              <a:t>    assert </a:t>
+            </a:r>
+            <a:r>
+              <a:rPr lang="en-US" sz="1800" dirty="0" err="1">
+                <a:latin typeface="Consolas" pitchFamily="49" charset="0"/>
+              </a:rPr>
+              <a:t>Character.isDigit</a:t>
+            </a:r>
+            <a:r>
+              <a:rPr lang="en-US" sz="1800" dirty="0">
+                <a:latin typeface="Consolas" pitchFamily="49" charset="0"/>
+              </a:rPr>
+              <a:t>((char) </a:t>
+            </a:r>
+            <a:r>
+              <a:rPr lang="en-US" sz="1800" dirty="0" err="1">
+                <a:latin typeface="Consolas" pitchFamily="49" charset="0"/>
+              </a:rPr>
+              <a:t>source.getChar</a:t>
+            </a:r>
+            <a:r>
+              <a:rPr lang="en-US" sz="1800" dirty="0">
+                <a:latin typeface="Consolas" pitchFamily="49" charset="0"/>
+              </a:rPr>
+              <a:t>()) : " ... ";</a:t>
             </a:r>
           </a:p>
           <a:p>
@@ -10749,6 +10649,152 @@
           </a:p>
         </p:txBody>
       </p:sp>
+      <p:sp>
+        <p:nvSpPr>
+          <p:cNvPr id="2" name="TextBox 1">
+            <a:extLst>
+              <a:ext uri="{FF2B5EF4-FFF2-40B4-BE49-F238E27FC236}">
+                <a16:creationId xmlns:a16="http://schemas.microsoft.com/office/drawing/2014/main" id="{5D832F53-6AC4-449D-B120-B2E096C3E553}"/>
+              </a:ext>
+            </a:extLst>
+          </p:cNvPr>
+          <p:cNvSpPr txBox="1"/>
+          <p:nvPr/>
+        </p:nvSpPr>
+        <p:spPr>
+          <a:xfrm>
+            <a:off x="4953000" y="3352800"/>
+            <a:ext cx="3365024" cy="369332"/>
+          </a:xfrm>
+          <a:prstGeom prst="rect">
+            <a:avLst/>
+          </a:prstGeom>
+          <a:noFill/>
+          <a:ln>
+            <a:solidFill>
+              <a:schemeClr val="tx1"/>
+            </a:solidFill>
+          </a:ln>
+        </p:spPr>
+        <p:txBody>
+          <a:bodyPr wrap="none" rtlCol="0">
+            <a:spAutoFit/>
+          </a:bodyPr>
+          <a:lstStyle/>
+          <a:p>
+            <a:r>
+              <a:rPr lang="en-US" sz="1800" dirty="0"/>
+              <a:t>assertion failure error message</a:t>
+            </a:r>
+          </a:p>
+        </p:txBody>
+      </p:sp>
+      <p:sp>
+        <p:nvSpPr>
+          <p:cNvPr id="3" name="Diamond 2">
+            <a:extLst>
+              <a:ext uri="{FF2B5EF4-FFF2-40B4-BE49-F238E27FC236}">
+                <a16:creationId xmlns:a16="http://schemas.microsoft.com/office/drawing/2014/main" id="{CBFDD796-0534-44CC-9380-761C20498FDC}"/>
+              </a:ext>
+            </a:extLst>
+          </p:cNvPr>
+          <p:cNvSpPr/>
+          <p:nvPr/>
+        </p:nvSpPr>
+        <p:spPr bwMode="auto">
+          <a:xfrm>
+            <a:off x="8008062" y="2667000"/>
+            <a:ext cx="182880" cy="182880"/>
+          </a:xfrm>
+          <a:prstGeom prst="diamond">
+            <a:avLst/>
+          </a:prstGeom>
+          <a:noFill/>
+          <a:ln w="9525" cap="flat" cmpd="sng" algn="ctr">
+            <a:noFill/>
+            <a:prstDash val="solid"/>
+            <a:round/>
+            <a:headEnd type="none" w="med" len="med"/>
+            <a:tailEnd type="none" w="med" len="med"/>
+          </a:ln>
+          <a:effectLst/>
+        </p:spPr>
+        <p:txBody>
+          <a:bodyPr vert="horz" wrap="none" lIns="92075" tIns="46038" rIns="92075" bIns="46038" numCol="1" rtlCol="0" anchor="ctr" anchorCtr="0" compatLnSpc="1">
+            <a:prstTxWarp prst="textNoShape">
+              <a:avLst/>
+            </a:prstTxWarp>
+          </a:bodyPr>
+          <a:lstStyle/>
+          <a:p>
+            <a:pPr marL="0" marR="0" indent="0" algn="ctr" defTabSz="914400" rtl="0" eaLnBrk="0" fontAlgn="base" latinLnBrk="0" hangingPunct="0">
+              <a:lnSpc>
+                <a:spcPct val="100000"/>
+              </a:lnSpc>
+              <a:spcBef>
+                <a:spcPct val="0"/>
+              </a:spcBef>
+              <a:spcAft>
+                <a:spcPct val="0"/>
+              </a:spcAft>
+              <a:buClrTx/>
+              <a:buSzTx/>
+              <a:buFontTx/>
+              <a:buNone/>
+              <a:tabLst/>
+            </a:pPr>
+            <a:endParaRPr kumimoji="0" lang="en-US" sz="2400" b="0" i="0" u="none" strike="noStrike" cap="none" normalizeH="0" baseline="0">
+              <a:ln>
+                <a:noFill/>
+              </a:ln>
+              <a:solidFill>
+                <a:schemeClr val="tx1"/>
+              </a:solidFill>
+              <a:effectLst/>
+              <a:latin typeface="Arial" charset="0"/>
+            </a:endParaRPr>
+          </a:p>
+        </p:txBody>
+      </p:sp>
+      <p:cxnSp>
+        <p:nvCxnSpPr>
+          <p:cNvPr id="5" name="Connector: Elbow 4">
+            <a:extLst>
+              <a:ext uri="{FF2B5EF4-FFF2-40B4-BE49-F238E27FC236}">
+                <a16:creationId xmlns:a16="http://schemas.microsoft.com/office/drawing/2014/main" id="{55B53492-135A-41E5-B171-AFFAFC1A50DA}"/>
+              </a:ext>
+            </a:extLst>
+          </p:cNvPr>
+          <p:cNvCxnSpPr>
+            <a:cxnSpLocks/>
+            <a:stCxn id="2" idx="0"/>
+            <a:endCxn id="3" idx="2"/>
+          </p:cNvCxnSpPr>
+          <p:nvPr/>
+        </p:nvCxnSpPr>
+        <p:spPr bwMode="auto">
+          <a:xfrm rot="5400000" flipH="1" flipV="1">
+            <a:off x="7116047" y="2369345"/>
+            <a:ext cx="502920" cy="1463990"/>
+          </a:xfrm>
+          <a:prstGeom prst="bentConnector3">
+            <a:avLst>
+              <a:gd name="adj1" fmla="val 50000"/>
+            </a:avLst>
+          </a:prstGeom>
+          <a:noFill/>
+          <a:ln w="9525" cap="flat" cmpd="sng" algn="ctr">
+            <a:solidFill>
+              <a:schemeClr val="tx1"/>
+            </a:solidFill>
+            <a:prstDash val="solid"/>
+            <a:round/>
+            <a:headEnd type="none" w="med" len="med"/>
+            <a:tailEnd type="triangle"/>
+          </a:ln>
+          <a:effectLst/>
+        </p:spPr>
+      </p:cxnSp>
     </p:spTree>
   </p:cSld>
   <p:clrMapOvr>
@@ -10844,7 +10890,7 @@
           <a:lstStyle/>
           <a:p>
             <a:r>
-              <a:rPr lang="en-US"/>
+              <a:rPr lang="en-US" dirty="0"/>
               <a:t>Tips on Scanning an Identifier</a:t>
             </a:r>
           </a:p>
@@ -12917,6 +12963,14 @@
             </a:r>
             <a:r>
               <a:rPr lang="en-US" sz="2400" dirty="0"/>
+              <a:t> in </a:t>
+            </a:r>
+            <a:r>
+              <a:rPr lang="en-US" sz="2400" dirty="0" err="1"/>
+              <a:t>ScannerTests</a:t>
+            </a:r>
+            <a:r>
+              <a:rPr lang="en-US" sz="2400" dirty="0"/>
               <a:t>)</a:t>
             </a:r>
           </a:p>
@@ -12948,7 +13002,7 @@
               <a:rPr lang="en-US" sz="1800" dirty="0">
                 <a:latin typeface="Consolas" pitchFamily="49" charset="0"/>
               </a:rPr>
-              <a:t>line:  2   char:  1   token: Reserved word: and</a:t>
+              <a:t>line:  2   char:  1   token: and</a:t>
             </a:r>
           </a:p>
           <a:p>
@@ -12963,7 +13017,7 @@
               <a:rPr lang="en-US" sz="1800" dirty="0">
                 <a:latin typeface="Consolas" pitchFamily="49" charset="0"/>
               </a:rPr>
-              <a:t>line:  2   char: 11   token: Reserved word: array</a:t>
+              <a:t>line:  2   char: 11   token: array</a:t>
             </a:r>
           </a:p>
           <a:p>
@@ -12978,7 +13032,7 @@
               <a:rPr lang="en-US" sz="1800" dirty="0">
                 <a:latin typeface="Consolas" pitchFamily="49" charset="0"/>
               </a:rPr>
-              <a:t>line:  2   char: 21   token: Reserved word: begin</a:t>
+              <a:t>line:  2   char: 21   token: begin</a:t>
             </a:r>
           </a:p>
           <a:p>
@@ -12993,7 +13047,7 @@
               <a:rPr lang="en-US" sz="1800" dirty="0">
                 <a:latin typeface="Consolas" pitchFamily="49" charset="0"/>
               </a:rPr>
-              <a:t>line:  2   char: 31   token: Reserved word: Boolean</a:t>
+              <a:t>line:  2   char: 31   token: Boolean</a:t>
             </a:r>
           </a:p>
           <a:p>
@@ -13023,7 +13077,7 @@
               <a:rPr lang="en-US" sz="1800" dirty="0">
                 <a:latin typeface="Consolas" pitchFamily="49" charset="0"/>
               </a:rPr>
-              <a:t>line:  9   char: 31   token: Reserved word: while</a:t>
+              <a:t>line:  9   char: 31   token: while</a:t>
             </a:r>
           </a:p>
           <a:p>
@@ -13038,7 +13092,7 @@
               <a:rPr lang="en-US" sz="1800" dirty="0">
                 <a:latin typeface="Consolas" pitchFamily="49" charset="0"/>
               </a:rPr>
-              <a:t>line:  9   char: 41   token: Reserved word: write</a:t>
+              <a:t>line:  9   char: 41   token: write</a:t>
             </a:r>
           </a:p>
           <a:p>
@@ -13053,7 +13107,7 @@
               <a:rPr lang="en-US" sz="1800" dirty="0">
                 <a:latin typeface="Consolas" pitchFamily="49" charset="0"/>
               </a:rPr>
-              <a:t>line: 10   char:  1   token: Reserved word: </a:t>
+              <a:t>line: 10   char:  1   token: </a:t>
             </a:r>
             <a:r>
               <a:rPr lang="en-US" sz="1800" dirty="0" err="1">
@@ -15120,12 +15174,8 @@
           <a:lstStyle/>
           <a:p>
             <a:r>
-              <a:rPr lang="en-US" dirty="0" err="1"/>
-              <a:t>Enum</a:t>
-            </a:r>
-            <a:r>
               <a:rPr lang="en-US" dirty="0"/>
-              <a:t> </a:t>
+              <a:t>Enum </a:t>
             </a:r>
             <a:r>
               <a:rPr lang="en-US" dirty="0">
@@ -15168,19 +15218,7 @@
               <a:rPr lang="en-US" sz="1800" dirty="0">
                 <a:latin typeface="Consolas" pitchFamily="49" charset="0"/>
               </a:rPr>
-              <a:t>public </a:t>
-            </a:r>
-            <a:r>
-              <a:rPr lang="en-US" sz="1800" dirty="0" err="1">
-                <a:latin typeface="Consolas" pitchFamily="49" charset="0"/>
-              </a:rPr>
-              <a:t>enum</a:t>
-            </a:r>
-            <a:r>
-              <a:rPr lang="en-US" sz="1800" dirty="0">
-                <a:latin typeface="Consolas" pitchFamily="49" charset="0"/>
-              </a:rPr>
-              <a:t> Symbol</a:t>
+              <a:t>public enum Symbol</a:t>
             </a:r>
           </a:p>
           <a:p>
@@ -15526,12 +15564,8 @@
           <a:lstStyle/>
           <a:p>
             <a:r>
-              <a:rPr lang="en-US" dirty="0" err="1"/>
-              <a:t>Enum</a:t>
-            </a:r>
-            <a:r>
               <a:rPr lang="en-US" dirty="0"/>
-              <a:t> </a:t>
+              <a:t>Enum </a:t>
             </a:r>
             <a:r>
               <a:rPr lang="en-US" dirty="0">

</xml_diff>

<commit_message>
created a handout of searching for reserved words and added a reference to it on one of the slides
</commit_message>
<xml_diff>
--- a/PowerPoint Slides/05 - Lexical Analysis.pptx
+++ b/PowerPoint Slides/05 - Lexical Analysis.pptx
@@ -40,7 +40,7 @@
     <p:sldId id="283" r:id="rId28"/>
   </p:sldIdLst>
   <p:sldSz cx="9144000" cy="6858000" type="screen4x3"/>
-  <p:notesSz cx="7010400" cy="9296400"/>
+  <p:notesSz cx="6881813" cy="9296400"/>
   <p:defaultTextStyle>
     <a:defPPr>
       <a:defRPr lang="en-US"/>
@@ -188,7 +188,7 @@
             <a:srgbClr val="A4A3A4"/>
           </p15:clr>
         </p15:guide>
-        <p15:guide id="2" pos="2208" userDrawn="1">
+        <p15:guide id="2" pos="2168" userDrawn="1">
           <p15:clr>
             <a:srgbClr val="A4A3A4"/>
           </p15:clr>
@@ -236,8 +236,8 @@
         </p:nvSpPr>
         <p:spPr bwMode="auto">
           <a:xfrm>
-            <a:off x="3972560" y="0"/>
-            <a:ext cx="3037840" cy="464578"/>
+            <a:off x="3899694" y="0"/>
+            <a:ext cx="2982119" cy="464578"/>
           </a:xfrm>
           <a:prstGeom prst="rect">
             <a:avLst/>
@@ -252,14 +252,14 @@
           <a:effectLst/>
         </p:spPr>
         <p:txBody>
-          <a:bodyPr vert="horz" wrap="square" lIns="93151" tIns="46578" rIns="93151" bIns="46578" numCol="1" anchor="t" anchorCtr="0" compatLnSpc="1">
+          <a:bodyPr vert="horz" wrap="square" lIns="92403" tIns="46204" rIns="92403" bIns="46204" numCol="1" anchor="t" anchorCtr="0" compatLnSpc="1">
             <a:prstTxWarp prst="textNoShape">
               <a:avLst/>
             </a:prstTxWarp>
           </a:bodyPr>
           <a:lstStyle>
-            <a:lvl1pPr algn="r" defTabSz="931572">
-              <a:defRPr sz="1200"/>
+            <a:lvl1pPr algn="r" defTabSz="924092">
+              <a:defRPr sz="1100"/>
             </a:lvl1pPr>
           </a:lstStyle>
           <a:p>
@@ -267,7 +267,7 @@
               <a:defRPr/>
             </a:pPr>
             <a:r>
-              <a:rPr lang="en-US" sz="1100" dirty="0">
+              <a:rPr lang="en-US" dirty="0">
                 <a:latin typeface="+mn-lt"/>
               </a:rPr>
               <a:t>Lexical Analysis</a:t>
@@ -287,8 +287,8 @@
         </p:nvSpPr>
         <p:spPr bwMode="auto">
           <a:xfrm>
-            <a:off x="3972560" y="8831823"/>
-            <a:ext cx="3037840" cy="464578"/>
+            <a:off x="3899694" y="8831823"/>
+            <a:ext cx="2982119" cy="464578"/>
           </a:xfrm>
           <a:prstGeom prst="rect">
             <a:avLst/>
@@ -303,14 +303,14 @@
           <a:effectLst/>
         </p:spPr>
         <p:txBody>
-          <a:bodyPr vert="horz" wrap="square" lIns="93151" tIns="46578" rIns="93151" bIns="46578" numCol="1" anchor="b" anchorCtr="0" compatLnSpc="1">
+          <a:bodyPr vert="horz" wrap="square" lIns="92403" tIns="46204" rIns="92403" bIns="46204" numCol="1" anchor="b" anchorCtr="0" compatLnSpc="1">
             <a:prstTxWarp prst="textNoShape">
               <a:avLst/>
             </a:prstTxWarp>
           </a:bodyPr>
           <a:lstStyle>
-            <a:lvl1pPr algn="r" defTabSz="931572">
-              <a:defRPr sz="1200"/>
+            <a:lvl1pPr algn="r" defTabSz="924092">
+              <a:defRPr sz="1100"/>
             </a:lvl1pPr>
           </a:lstStyle>
           <a:p>
@@ -318,13 +318,13 @@
               <a:defRPr/>
             </a:pPr>
             <a:r>
-              <a:rPr lang="en-US" sz="1100">
+              <a:rPr lang="en-US">
                 <a:latin typeface="+mn-lt"/>
               </a:rPr>
               <a:t>5-</a:t>
             </a:r>
             <a:fld id="{DCACF098-5A80-4312-876C-D73E621E1E63}" type="slidenum">
-              <a:rPr lang="en-US" sz="1100">
+              <a:rPr lang="en-US">
                 <a:latin typeface="+mn-lt"/>
               </a:rPr>
               <a:pPr>
@@ -332,7 +332,7 @@
               </a:pPr>
               <a:t>‹#›</a:t>
             </a:fld>
-            <a:endParaRPr lang="en-US" sz="1100">
+            <a:endParaRPr lang="en-US">
               <a:latin typeface="+mn-lt"/>
             </a:endParaRPr>
           </a:p>
@@ -387,7 +387,7 @@
         <p:spPr bwMode="auto">
           <a:xfrm>
             <a:off x="0" y="0"/>
-            <a:ext cx="3037840" cy="464578"/>
+            <a:ext cx="2982119" cy="464578"/>
           </a:xfrm>
           <a:prstGeom prst="rect">
             <a:avLst/>
@@ -402,14 +402,14 @@
           <a:effectLst/>
         </p:spPr>
         <p:txBody>
-          <a:bodyPr vert="horz" wrap="square" lIns="93151" tIns="46578" rIns="93151" bIns="46578" numCol="1" anchor="t" anchorCtr="0" compatLnSpc="1">
+          <a:bodyPr vert="horz" wrap="square" lIns="92403" tIns="46204" rIns="92403" bIns="46204" numCol="1" anchor="t" anchorCtr="0" compatLnSpc="1">
             <a:prstTxWarp prst="textNoShape">
               <a:avLst/>
             </a:prstTxWarp>
           </a:bodyPr>
           <a:lstStyle>
-            <a:lvl1pPr algn="l" defTabSz="931572">
-              <a:defRPr sz="1200"/>
+            <a:lvl1pPr algn="l" defTabSz="924092">
+              <a:defRPr sz="1100"/>
             </a:lvl1pPr>
           </a:lstStyle>
           <a:p>
@@ -435,8 +435,8 @@
         </p:nvSpPr>
         <p:spPr bwMode="auto">
           <a:xfrm>
-            <a:off x="3972560" y="0"/>
-            <a:ext cx="3037840" cy="464578"/>
+            <a:off x="3899694" y="0"/>
+            <a:ext cx="2982119" cy="464578"/>
           </a:xfrm>
           <a:prstGeom prst="rect">
             <a:avLst/>
@@ -451,14 +451,14 @@
           <a:effectLst/>
         </p:spPr>
         <p:txBody>
-          <a:bodyPr vert="horz" wrap="square" lIns="93151" tIns="46578" rIns="93151" bIns="46578" numCol="1" anchor="t" anchorCtr="0" compatLnSpc="1">
+          <a:bodyPr vert="horz" wrap="square" lIns="92403" tIns="46204" rIns="92403" bIns="46204" numCol="1" anchor="t" anchorCtr="0" compatLnSpc="1">
             <a:prstTxWarp prst="textNoShape">
               <a:avLst/>
             </a:prstTxWarp>
           </a:bodyPr>
           <a:lstStyle>
-            <a:lvl1pPr algn="r" defTabSz="931572">
-              <a:defRPr sz="1200"/>
+            <a:lvl1pPr algn="r" defTabSz="924092">
+              <a:defRPr sz="1100"/>
             </a:lvl1pPr>
           </a:lstStyle>
           <a:p>
@@ -481,8 +481,8 @@
         </p:nvSpPr>
         <p:spPr bwMode="auto">
           <a:xfrm>
-            <a:off x="1182688" y="696913"/>
-            <a:ext cx="4646612" cy="3486150"/>
+            <a:off x="1117600" y="696913"/>
+            <a:ext cx="4648200" cy="3486150"/>
           </a:xfrm>
           <a:prstGeom prst="rect">
             <a:avLst/>
@@ -510,8 +510,8 @@
         </p:nvSpPr>
         <p:spPr bwMode="auto">
           <a:xfrm>
-            <a:off x="934720" y="4415912"/>
-            <a:ext cx="5140960" cy="4182813"/>
+            <a:off x="917575" y="4415913"/>
+            <a:ext cx="5046663" cy="4182813"/>
           </a:xfrm>
           <a:prstGeom prst="rect">
             <a:avLst/>
@@ -526,7 +526,7 @@
           <a:effectLst/>
         </p:spPr>
         <p:txBody>
-          <a:bodyPr vert="horz" wrap="square" lIns="93151" tIns="46578" rIns="93151" bIns="46578" numCol="1" anchor="t" anchorCtr="0" compatLnSpc="1">
+          <a:bodyPr vert="horz" wrap="square" lIns="92403" tIns="46204" rIns="92403" bIns="46204" numCol="1" anchor="t" anchorCtr="0" compatLnSpc="1">
             <a:prstTxWarp prst="textNoShape">
               <a:avLst/>
             </a:prstTxWarp>
@@ -582,7 +582,7 @@
         <p:spPr bwMode="auto">
           <a:xfrm>
             <a:off x="0" y="8831823"/>
-            <a:ext cx="3037840" cy="464578"/>
+            <a:ext cx="2982119" cy="464578"/>
           </a:xfrm>
           <a:prstGeom prst="rect">
             <a:avLst/>
@@ -597,14 +597,14 @@
           <a:effectLst/>
         </p:spPr>
         <p:txBody>
-          <a:bodyPr vert="horz" wrap="square" lIns="93151" tIns="46578" rIns="93151" bIns="46578" numCol="1" anchor="b" anchorCtr="0" compatLnSpc="1">
+          <a:bodyPr vert="horz" wrap="square" lIns="92403" tIns="46204" rIns="92403" bIns="46204" numCol="1" anchor="b" anchorCtr="0" compatLnSpc="1">
             <a:prstTxWarp prst="textNoShape">
               <a:avLst/>
             </a:prstTxWarp>
           </a:bodyPr>
           <a:lstStyle>
-            <a:lvl1pPr algn="l" defTabSz="931572">
-              <a:defRPr sz="1200"/>
+            <a:lvl1pPr algn="l" defTabSz="924092">
+              <a:defRPr sz="1100"/>
             </a:lvl1pPr>
           </a:lstStyle>
           <a:p>
@@ -627,8 +627,8 @@
         </p:nvSpPr>
         <p:spPr bwMode="auto">
           <a:xfrm>
-            <a:off x="3972560" y="8831823"/>
-            <a:ext cx="3037840" cy="464578"/>
+            <a:off x="3899694" y="8831823"/>
+            <a:ext cx="2982119" cy="464578"/>
           </a:xfrm>
           <a:prstGeom prst="rect">
             <a:avLst/>
@@ -643,14 +643,14 @@
           <a:effectLst/>
         </p:spPr>
         <p:txBody>
-          <a:bodyPr vert="horz" wrap="square" lIns="93151" tIns="46578" rIns="93151" bIns="46578" numCol="1" anchor="b" anchorCtr="0" compatLnSpc="1">
+          <a:bodyPr vert="horz" wrap="square" lIns="92403" tIns="46204" rIns="92403" bIns="46204" numCol="1" anchor="b" anchorCtr="0" compatLnSpc="1">
             <a:prstTxWarp prst="textNoShape">
               <a:avLst/>
             </a:prstTxWarp>
           </a:bodyPr>
           <a:lstStyle>
-            <a:lvl1pPr algn="r" defTabSz="931572">
-              <a:defRPr sz="1200"/>
+            <a:lvl1pPr algn="r" defTabSz="924092">
+              <a:defRPr sz="1100"/>
             </a:lvl1pPr>
           </a:lstStyle>
           <a:p>
@@ -8324,19 +8324,7 @@
               <a:rPr lang="en-US" sz="1800" dirty="0">
                 <a:latin typeface="Consolas" pitchFamily="49" charset="0"/>
               </a:rPr>
-              <a:t>    </a:t>
-            </a:r>
-            <a:r>
-              <a:rPr lang="en-US" sz="1800" dirty="0" err="1">
-                <a:latin typeface="Consolas" pitchFamily="49" charset="0"/>
-              </a:rPr>
-              <a:t>textm</a:t>
-            </a:r>
-            <a:r>
-              <a:rPr lang="en-US" sz="1800" dirty="0">
-                <a:latin typeface="Consolas" pitchFamily="49" charset="0"/>
-              </a:rPr>
-              <a:t>= null;</a:t>
+              <a:t>    text = null;</a:t>
             </a:r>
           </a:p>
           <a:p>
@@ -8417,8 +8405,17 @@
               <a:rPr lang="en-US" sz="1800" dirty="0">
                 <a:latin typeface="Consolas" pitchFamily="49" charset="0"/>
               </a:rPr>
-              <a:t>        // set symbol but don't advance</a:t>
-            </a:r>
+              <a:t>        // set symbol but don't </a:t>
+            </a:r>
+            <a:r>
+              <a:rPr lang="en-US" sz="1800">
+                <a:latin typeface="Consolas" pitchFamily="49" charset="0"/>
+              </a:rPr>
+              <a:t>advance source</a:t>
+            </a:r>
+            <a:endParaRPr lang="en-US" sz="1800" dirty="0">
+              <a:latin typeface="Consolas" pitchFamily="49" charset="0"/>
+            </a:endParaRPr>
           </a:p>
           <a:p>
             <a:pPr marL="0" indent="0">
@@ -11135,6 +11132,46 @@
                 <a:latin typeface="Consolas" pitchFamily="49" charset="0"/>
               </a:rPr>
               <a:t>)</a:t>
+            </a:r>
+          </a:p>
+        </p:txBody>
+      </p:sp>
+      <p:sp>
+        <p:nvSpPr>
+          <p:cNvPr id="3" name="TextBox 2">
+            <a:extLst>
+              <a:ext uri="{FF2B5EF4-FFF2-40B4-BE49-F238E27FC236}">
+                <a16:creationId xmlns:a16="http://schemas.microsoft.com/office/drawing/2014/main" id="{2EEEA000-159B-4321-8DC7-99357BC94DE7}"/>
+              </a:ext>
+            </a:extLst>
+          </p:cNvPr>
+          <p:cNvSpPr txBox="1"/>
+          <p:nvPr/>
+        </p:nvSpPr>
+        <p:spPr>
+          <a:xfrm>
+            <a:off x="1847440" y="5812414"/>
+            <a:ext cx="5449120" cy="400110"/>
+          </a:xfrm>
+          <a:prstGeom prst="rect">
+            <a:avLst/>
+          </a:prstGeom>
+          <a:noFill/>
+          <a:ln>
+            <a:solidFill>
+              <a:schemeClr val="tx1"/>
+            </a:solidFill>
+          </a:ln>
+        </p:spPr>
+        <p:txBody>
+          <a:bodyPr wrap="none" rtlCol="0">
+            <a:spAutoFit/>
+          </a:bodyPr>
+          <a:lstStyle/>
+          <a:p>
+            <a:r>
+              <a:rPr lang="en-US" sz="2000" dirty="0"/>
+              <a:t>See handout “Searching for Reserved Words”.</a:t>
             </a:r>
           </a:p>
         </p:txBody>

</xml_diff>

<commit_message>
Modified code for printToken() and results for testing Correct_01.cprl to reflect recent changes that show “Reserved Word ->” as part of output.
</commit_message>
<xml_diff>
--- a/PowerPoint Slides/05 - Lexical Analysis.pptx
+++ b/PowerPoint Slides/05 - Lexical Analysis.pptx
@@ -40,7 +40,7 @@
     <p:sldId id="283" r:id="rId28"/>
   </p:sldIdLst>
   <p:sldSz cx="9144000" cy="6858000" type="screen4x3"/>
-  <p:notesSz cx="6881813" cy="9296400"/>
+  <p:notesSz cx="7315200" cy="9601200"/>
   <p:defaultTextStyle>
     <a:defPPr>
       <a:defRPr lang="en-US"/>
@@ -183,12 +183,12 @@
     </p:ext>
     <p:ext uri="{2D200454-40CA-4A62-9FC3-DE9A4176ACB9}">
       <p15:notesGuideLst xmlns:p15="http://schemas.microsoft.com/office/powerpoint/2012/main">
-        <p15:guide id="1" orient="horz" pos="2929" userDrawn="1">
+        <p15:guide id="1" orient="horz" pos="3025" userDrawn="1">
           <p15:clr>
             <a:srgbClr val="A4A3A4"/>
           </p15:clr>
         </p15:guide>
-        <p15:guide id="2" pos="2168" userDrawn="1">
+        <p15:guide id="2" pos="2305" userDrawn="1">
           <p15:clr>
             <a:srgbClr val="A4A3A4"/>
           </p15:clr>
@@ -236,8 +236,8 @@
         </p:nvSpPr>
         <p:spPr bwMode="auto">
           <a:xfrm>
-            <a:off x="3899694" y="0"/>
-            <a:ext cx="2982119" cy="464578"/>
+            <a:off x="4145281" y="0"/>
+            <a:ext cx="3169920" cy="479810"/>
           </a:xfrm>
           <a:prstGeom prst="rect">
             <a:avLst/>
@@ -252,14 +252,14 @@
           <a:effectLst/>
         </p:spPr>
         <p:txBody>
-          <a:bodyPr vert="horz" wrap="square" lIns="92403" tIns="46204" rIns="92403" bIns="46204" numCol="1" anchor="t" anchorCtr="0" compatLnSpc="1">
+          <a:bodyPr vert="horz" wrap="square" lIns="96617" tIns="48311" rIns="96617" bIns="48311" numCol="1" anchor="t" anchorCtr="0" compatLnSpc="1">
             <a:prstTxWarp prst="textNoShape">
               <a:avLst/>
             </a:prstTxWarp>
           </a:bodyPr>
           <a:lstStyle>
-            <a:lvl1pPr algn="r" defTabSz="924092">
-              <a:defRPr sz="1100"/>
+            <a:lvl1pPr algn="r" defTabSz="966231">
+              <a:defRPr sz="1200"/>
             </a:lvl1pPr>
           </a:lstStyle>
           <a:p>
@@ -287,8 +287,8 @@
         </p:nvSpPr>
         <p:spPr bwMode="auto">
           <a:xfrm>
-            <a:off x="3899694" y="8831823"/>
-            <a:ext cx="2982119" cy="464578"/>
+            <a:off x="4145281" y="9121391"/>
+            <a:ext cx="3169920" cy="479810"/>
           </a:xfrm>
           <a:prstGeom prst="rect">
             <a:avLst/>
@@ -303,14 +303,14 @@
           <a:effectLst/>
         </p:spPr>
         <p:txBody>
-          <a:bodyPr vert="horz" wrap="square" lIns="92403" tIns="46204" rIns="92403" bIns="46204" numCol="1" anchor="b" anchorCtr="0" compatLnSpc="1">
+          <a:bodyPr vert="horz" wrap="square" lIns="96617" tIns="48311" rIns="96617" bIns="48311" numCol="1" anchor="b" anchorCtr="0" compatLnSpc="1">
             <a:prstTxWarp prst="textNoShape">
               <a:avLst/>
             </a:prstTxWarp>
           </a:bodyPr>
           <a:lstStyle>
-            <a:lvl1pPr algn="r" defTabSz="924092">
-              <a:defRPr sz="1100"/>
+            <a:lvl1pPr algn="r" defTabSz="966231">
+              <a:defRPr sz="1200"/>
             </a:lvl1pPr>
           </a:lstStyle>
           <a:p>
@@ -386,8 +386,8 @@
         </p:nvSpPr>
         <p:spPr bwMode="auto">
           <a:xfrm>
-            <a:off x="0" y="0"/>
-            <a:ext cx="2982119" cy="464578"/>
+            <a:off x="1" y="0"/>
+            <a:ext cx="3169920" cy="479810"/>
           </a:xfrm>
           <a:prstGeom prst="rect">
             <a:avLst/>
@@ -402,14 +402,14 @@
           <a:effectLst/>
         </p:spPr>
         <p:txBody>
-          <a:bodyPr vert="horz" wrap="square" lIns="92403" tIns="46204" rIns="92403" bIns="46204" numCol="1" anchor="t" anchorCtr="0" compatLnSpc="1">
+          <a:bodyPr vert="horz" wrap="square" lIns="96617" tIns="48311" rIns="96617" bIns="48311" numCol="1" anchor="t" anchorCtr="0" compatLnSpc="1">
             <a:prstTxWarp prst="textNoShape">
               <a:avLst/>
             </a:prstTxWarp>
           </a:bodyPr>
           <a:lstStyle>
-            <a:lvl1pPr algn="l" defTabSz="924092">
-              <a:defRPr sz="1100"/>
+            <a:lvl1pPr algn="l" defTabSz="966231">
+              <a:defRPr sz="1200"/>
             </a:lvl1pPr>
           </a:lstStyle>
           <a:p>
@@ -435,8 +435,8 @@
         </p:nvSpPr>
         <p:spPr bwMode="auto">
           <a:xfrm>
-            <a:off x="3899694" y="0"/>
-            <a:ext cx="2982119" cy="464578"/>
+            <a:off x="4145281" y="0"/>
+            <a:ext cx="3169920" cy="479810"/>
           </a:xfrm>
           <a:prstGeom prst="rect">
             <a:avLst/>
@@ -451,14 +451,14 @@
           <a:effectLst/>
         </p:spPr>
         <p:txBody>
-          <a:bodyPr vert="horz" wrap="square" lIns="92403" tIns="46204" rIns="92403" bIns="46204" numCol="1" anchor="t" anchorCtr="0" compatLnSpc="1">
+          <a:bodyPr vert="horz" wrap="square" lIns="96617" tIns="48311" rIns="96617" bIns="48311" numCol="1" anchor="t" anchorCtr="0" compatLnSpc="1">
             <a:prstTxWarp prst="textNoShape">
               <a:avLst/>
             </a:prstTxWarp>
           </a:bodyPr>
           <a:lstStyle>
-            <a:lvl1pPr algn="r" defTabSz="924092">
-              <a:defRPr sz="1100"/>
+            <a:lvl1pPr algn="r" defTabSz="966231">
+              <a:defRPr sz="1200"/>
             </a:lvl1pPr>
           </a:lstStyle>
           <a:p>
@@ -481,8 +481,8 @@
         </p:nvSpPr>
         <p:spPr bwMode="auto">
           <a:xfrm>
-            <a:off x="1117600" y="696913"/>
-            <a:ext cx="4648200" cy="3486150"/>
+            <a:off x="1257300" y="719138"/>
+            <a:ext cx="4802188" cy="3600450"/>
           </a:xfrm>
           <a:prstGeom prst="rect">
             <a:avLst/>
@@ -510,8 +510,8 @@
         </p:nvSpPr>
         <p:spPr bwMode="auto">
           <a:xfrm>
-            <a:off x="917575" y="4415913"/>
-            <a:ext cx="5046663" cy="4182813"/>
+            <a:off x="975361" y="4560698"/>
+            <a:ext cx="5364480" cy="4319954"/>
           </a:xfrm>
           <a:prstGeom prst="rect">
             <a:avLst/>
@@ -526,7 +526,7 @@
           <a:effectLst/>
         </p:spPr>
         <p:txBody>
-          <a:bodyPr vert="horz" wrap="square" lIns="92403" tIns="46204" rIns="92403" bIns="46204" numCol="1" anchor="t" anchorCtr="0" compatLnSpc="1">
+          <a:bodyPr vert="horz" wrap="square" lIns="96617" tIns="48311" rIns="96617" bIns="48311" numCol="1" anchor="t" anchorCtr="0" compatLnSpc="1">
             <a:prstTxWarp prst="textNoShape">
               <a:avLst/>
             </a:prstTxWarp>
@@ -581,8 +581,8 @@
         </p:nvSpPr>
         <p:spPr bwMode="auto">
           <a:xfrm>
-            <a:off x="0" y="8831823"/>
-            <a:ext cx="2982119" cy="464578"/>
+            <a:off x="1" y="9121391"/>
+            <a:ext cx="3169920" cy="479810"/>
           </a:xfrm>
           <a:prstGeom prst="rect">
             <a:avLst/>
@@ -597,14 +597,14 @@
           <a:effectLst/>
         </p:spPr>
         <p:txBody>
-          <a:bodyPr vert="horz" wrap="square" lIns="92403" tIns="46204" rIns="92403" bIns="46204" numCol="1" anchor="b" anchorCtr="0" compatLnSpc="1">
+          <a:bodyPr vert="horz" wrap="square" lIns="96617" tIns="48311" rIns="96617" bIns="48311" numCol="1" anchor="b" anchorCtr="0" compatLnSpc="1">
             <a:prstTxWarp prst="textNoShape">
               <a:avLst/>
             </a:prstTxWarp>
           </a:bodyPr>
           <a:lstStyle>
-            <a:lvl1pPr algn="l" defTabSz="924092">
-              <a:defRPr sz="1100"/>
+            <a:lvl1pPr algn="l" defTabSz="966231">
+              <a:defRPr sz="1200"/>
             </a:lvl1pPr>
           </a:lstStyle>
           <a:p>
@@ -627,8 +627,8 @@
         </p:nvSpPr>
         <p:spPr bwMode="auto">
           <a:xfrm>
-            <a:off x="3899694" y="8831823"/>
-            <a:ext cx="2982119" cy="464578"/>
+            <a:off x="4145281" y="9121391"/>
+            <a:ext cx="3169920" cy="479810"/>
           </a:xfrm>
           <a:prstGeom prst="rect">
             <a:avLst/>
@@ -643,14 +643,14 @@
           <a:effectLst/>
         </p:spPr>
         <p:txBody>
-          <a:bodyPr vert="horz" wrap="square" lIns="92403" tIns="46204" rIns="92403" bIns="46204" numCol="1" anchor="b" anchorCtr="0" compatLnSpc="1">
+          <a:bodyPr vert="horz" wrap="square" lIns="96617" tIns="48311" rIns="96617" bIns="48311" numCol="1" anchor="b" anchorCtr="0" compatLnSpc="1">
             <a:prstTxWarp prst="textNoShape">
               <a:avLst/>
             </a:prstTxWarp>
           </a:bodyPr>
           <a:lstStyle>
-            <a:lvl1pPr algn="r" defTabSz="924092">
-              <a:defRPr sz="1100"/>
+            <a:lvl1pPr algn="r" defTabSz="966231">
+              <a:defRPr sz="1200"/>
             </a:lvl1pPr>
           </a:lstStyle>
           <a:p>
@@ -12494,19 +12494,64 @@
               <a:rPr lang="en-US" sz="1800" dirty="0">
                 <a:latin typeface="Consolas" pitchFamily="49" charset="0"/>
               </a:rPr>
-              <a:t>public static void </a:t>
+              <a:t>public static void printToken(Token token)</a:t>
+            </a:r>
+          </a:p>
+          <a:p>
+            <a:pPr marL="91440" indent="0">
+              <a:spcBef>
+                <a:spcPts val="100"/>
+              </a:spcBef>
+              <a:buFontTx/>
+              <a:buNone/>
+            </a:pPr>
+            <a:r>
+              <a:rPr lang="en-US" sz="1800" dirty="0">
+                <a:latin typeface="Consolas" pitchFamily="49" charset="0"/>
+              </a:rPr>
+              <a:t>  {</a:t>
+            </a:r>
+          </a:p>
+          <a:p>
+            <a:pPr marL="91440" indent="0">
+              <a:spcBef>
+                <a:spcPts val="100"/>
+              </a:spcBef>
+              <a:buFontTx/>
+              <a:buNone/>
+            </a:pPr>
+            <a:r>
+              <a:rPr lang="en-US" sz="1800" dirty="0">
+                <a:latin typeface="Consolas" pitchFamily="49" charset="0"/>
+              </a:rPr>
+              <a:t>    System.out.printf("line: %2d   char: %2d   token: ", </a:t>
+            </a:r>
+          </a:p>
+          <a:p>
+            <a:pPr marL="91440" indent="0">
+              <a:spcBef>
+                <a:spcPts val="100"/>
+              </a:spcBef>
+              <a:buFontTx/>
+              <a:buNone/>
+            </a:pPr>
+            <a:r>
+              <a:rPr lang="en-US" sz="1800" dirty="0">
+                <a:latin typeface="Consolas" pitchFamily="49" charset="0"/>
+              </a:rPr>
+              <a:t>        token.getPosition().</a:t>
             </a:r>
             <a:r>
               <a:rPr lang="en-US" sz="1800" dirty="0" err="1">
                 <a:latin typeface="Consolas" pitchFamily="49" charset="0"/>
               </a:rPr>
-              <a:t>printToken</a:t>
-            </a:r>
-            <a:r>
-              <a:rPr lang="en-US" sz="1800" dirty="0">
-                <a:latin typeface="Consolas" pitchFamily="49" charset="0"/>
-              </a:rPr>
-              <a:t>(Token token)</a:t>
+              <a:t>getLineNumber</a:t>
+            </a:r>
+            <a:r>
+              <a:rPr lang="en-US" sz="1800" dirty="0">
+                <a:latin typeface="Consolas" pitchFamily="49" charset="0"/>
+              </a:rPr>
+              <a:t>(),</a:t>
             </a:r>
           </a:p>
           <a:p>
@@ -12521,7 +12566,19 @@
               <a:rPr lang="en-US" sz="1800" dirty="0">
                 <a:latin typeface="Consolas" pitchFamily="49" charset="0"/>
               </a:rPr>
-              <a:t>  {</a:t>
+              <a:t>        token.getPosition().</a:t>
+            </a:r>
+            <a:r>
+              <a:rPr lang="en-US" sz="1800" dirty="0" err="1">
+                <a:latin typeface="Consolas" pitchFamily="49" charset="0"/>
+              </a:rPr>
+              <a:t>getCharNumber</a:t>
+            </a:r>
+            <a:r>
+              <a:rPr lang="en-US" sz="1800" dirty="0">
+                <a:latin typeface="Consolas" pitchFamily="49" charset="0"/>
+              </a:rPr>
+              <a:t>());</a:t>
             </a:r>
           </a:p>
           <a:p>
@@ -12532,135 +12589,6 @@
               <a:buFontTx/>
               <a:buNone/>
             </a:pPr>
-            <a:r>
-              <a:rPr lang="en-US" sz="1800" dirty="0">
-                <a:latin typeface="Consolas" pitchFamily="49" charset="0"/>
-              </a:rPr>
-              <a:t>    </a:t>
-            </a:r>
-            <a:r>
-              <a:rPr lang="en-US" sz="1800" dirty="0" err="1">
-                <a:latin typeface="Consolas" pitchFamily="49" charset="0"/>
-              </a:rPr>
-              <a:t>System.out.printf</a:t>
-            </a:r>
-            <a:r>
-              <a:rPr lang="en-US" sz="1800" dirty="0">
-                <a:latin typeface="Consolas" pitchFamily="49" charset="0"/>
-              </a:rPr>
-              <a:t>("line: %2d   char: %2d   token: ", </a:t>
-            </a:r>
-          </a:p>
-          <a:p>
-            <a:pPr marL="91440" indent="0">
-              <a:spcBef>
-                <a:spcPts val="100"/>
-              </a:spcBef>
-              <a:buFontTx/>
-              <a:buNone/>
-            </a:pPr>
-            <a:r>
-              <a:rPr lang="en-US" sz="1800" dirty="0">
-                <a:latin typeface="Consolas" pitchFamily="49" charset="0"/>
-              </a:rPr>
-              <a:t>        </a:t>
-            </a:r>
-            <a:r>
-              <a:rPr lang="en-US" sz="1800" dirty="0" err="1">
-                <a:latin typeface="Consolas" pitchFamily="49" charset="0"/>
-              </a:rPr>
-              <a:t>token.getPosition</a:t>
-            </a:r>
-            <a:r>
-              <a:rPr lang="en-US" sz="1800" dirty="0">
-                <a:latin typeface="Consolas" pitchFamily="49" charset="0"/>
-              </a:rPr>
-              <a:t>().</a:t>
-            </a:r>
-            <a:r>
-              <a:rPr lang="en-US" sz="1800" dirty="0" err="1">
-                <a:latin typeface="Consolas" pitchFamily="49" charset="0"/>
-              </a:rPr>
-              <a:t>getLineNumber</a:t>
-            </a:r>
-            <a:r>
-              <a:rPr lang="en-US" sz="1800" dirty="0">
-                <a:latin typeface="Consolas" pitchFamily="49" charset="0"/>
-              </a:rPr>
-              <a:t>(),</a:t>
-            </a:r>
-          </a:p>
-          <a:p>
-            <a:pPr marL="91440" indent="0">
-              <a:spcBef>
-                <a:spcPts val="100"/>
-              </a:spcBef>
-              <a:buFontTx/>
-              <a:buNone/>
-            </a:pPr>
-            <a:r>
-              <a:rPr lang="en-US" sz="1800" dirty="0">
-                <a:latin typeface="Consolas" pitchFamily="49" charset="0"/>
-              </a:rPr>
-              <a:t>        </a:t>
-            </a:r>
-            <a:r>
-              <a:rPr lang="en-US" sz="1800" dirty="0" err="1">
-                <a:latin typeface="Consolas" pitchFamily="49" charset="0"/>
-              </a:rPr>
-              <a:t>token.getPosition</a:t>
-            </a:r>
-            <a:r>
-              <a:rPr lang="en-US" sz="1800" dirty="0">
-                <a:latin typeface="Consolas" pitchFamily="49" charset="0"/>
-              </a:rPr>
-              <a:t>().</a:t>
-            </a:r>
-            <a:r>
-              <a:rPr lang="en-US" sz="1800" dirty="0" err="1">
-                <a:latin typeface="Consolas" pitchFamily="49" charset="0"/>
-              </a:rPr>
-              <a:t>getCharNumber</a:t>
-            </a:r>
-            <a:r>
-              <a:rPr lang="en-US" sz="1800" dirty="0">
-                <a:latin typeface="Consolas" pitchFamily="49" charset="0"/>
-              </a:rPr>
-              <a:t>());</a:t>
-            </a:r>
-          </a:p>
-          <a:p>
-            <a:pPr marL="91440" indent="0">
-              <a:spcBef>
-                <a:spcPts val="100"/>
-              </a:spcBef>
-              <a:buFontTx/>
-              <a:buNone/>
-            </a:pPr>
-            <a:r>
-              <a:rPr lang="en-US" sz="1800" dirty="0">
-                <a:latin typeface="Consolas" pitchFamily="49" charset="0"/>
-              </a:rPr>
-              <a:t>    if (   </a:t>
-            </a:r>
-            <a:r>
-              <a:rPr lang="en-US" sz="1800" dirty="0" err="1">
-                <a:latin typeface="Consolas" pitchFamily="49" charset="0"/>
-              </a:rPr>
-              <a:t>token.getSymbol</a:t>
-            </a:r>
-            <a:r>
-              <a:rPr lang="en-US" sz="1800" dirty="0">
-                <a:latin typeface="Consolas" pitchFamily="49" charset="0"/>
-              </a:rPr>
-              <a:t>() == </a:t>
-            </a:r>
-            <a:r>
-              <a:rPr lang="en-US" sz="1800" dirty="0" err="1">
-                <a:latin typeface="Consolas" pitchFamily="49" charset="0"/>
-              </a:rPr>
-              <a:t>Symbol.identifier</a:t>
-            </a:r>
             <a:endParaRPr lang="en-US" sz="1800" dirty="0">
               <a:latin typeface="Consolas" pitchFamily="49" charset="0"/>
             </a:endParaRPr>
@@ -12677,26 +12605,170 @@
               <a:rPr lang="en-US" sz="1800" dirty="0">
                 <a:latin typeface="Consolas" pitchFamily="49" charset="0"/>
               </a:rPr>
-              <a:t>        || </a:t>
+              <a:t>    Symbol </a:t>
             </a:r>
             <a:r>
               <a:rPr lang="en-US" sz="1800" dirty="0" err="1">
                 <a:latin typeface="Consolas" pitchFamily="49" charset="0"/>
               </a:rPr>
-              <a:t>token.getSymbol</a:t>
-            </a:r>
-            <a:r>
-              <a:rPr lang="en-US" sz="1800" dirty="0">
-                <a:latin typeface="Consolas" pitchFamily="49" charset="0"/>
-              </a:rPr>
-              <a:t>() == </a:t>
+              <a:t>symbol</a:t>
+            </a:r>
+            <a:r>
+              <a:rPr lang="en-US" sz="1800" dirty="0">
+                <a:latin typeface="Consolas" pitchFamily="49" charset="0"/>
+              </a:rPr>
+              <a:t> = token.getSymbol();</a:t>
+            </a:r>
+          </a:p>
+          <a:p>
+            <a:pPr marL="91440" indent="0">
+              <a:spcBef>
+                <a:spcPts val="100"/>
+              </a:spcBef>
+              <a:buFontTx/>
+              <a:buNone/>
+            </a:pPr>
+            <a:r>
+              <a:rPr lang="en-US" sz="1800" dirty="0">
+                <a:latin typeface="Consolas" pitchFamily="49" charset="0"/>
+              </a:rPr>
+              <a:t>    if (</a:t>
             </a:r>
             <a:r>
               <a:rPr lang="en-US" sz="1800" dirty="0" err="1">
                 <a:latin typeface="Consolas" pitchFamily="49" charset="0"/>
               </a:rPr>
-              <a:t>Symbol.intLiteral</a:t>
-            </a:r>
+              <a:t>symbol.isReservedWord</a:t>
+            </a:r>
+            <a:r>
+              <a:rPr lang="en-US" sz="1800" dirty="0">
+                <a:latin typeface="Consolas" pitchFamily="49" charset="0"/>
+              </a:rPr>
+              <a:t>())</a:t>
+            </a:r>
+          </a:p>
+          <a:p>
+            <a:pPr marL="91440" indent="0">
+              <a:spcBef>
+                <a:spcPts val="100"/>
+              </a:spcBef>
+              <a:buFontTx/>
+              <a:buNone/>
+            </a:pPr>
+            <a:r>
+              <a:rPr lang="en-US" sz="1800" dirty="0">
+                <a:latin typeface="Consolas" pitchFamily="49" charset="0"/>
+              </a:rPr>
+              <a:t>        </a:t>
+            </a:r>
+            <a:r>
+              <a:rPr lang="en-US" sz="1800" dirty="0" err="1">
+                <a:latin typeface="Consolas" pitchFamily="49" charset="0"/>
+              </a:rPr>
+              <a:t>System.out.print</a:t>
+            </a:r>
+            <a:r>
+              <a:rPr lang="en-US" sz="1800" dirty="0">
+                <a:latin typeface="Consolas" pitchFamily="49" charset="0"/>
+              </a:rPr>
+              <a:t>("Reserved Word -&gt; ");</a:t>
+            </a:r>
+          </a:p>
+          <a:p>
+            <a:pPr marL="91440" indent="0">
+              <a:spcBef>
+                <a:spcPts val="100"/>
+              </a:spcBef>
+              <a:buFontTx/>
+              <a:buNone/>
+            </a:pPr>
+            <a:r>
+              <a:rPr lang="en-US" sz="1800" dirty="0">
+                <a:latin typeface="Consolas" pitchFamily="49" charset="0"/>
+              </a:rPr>
+              <a:t>    else if (   symbol == Symbol.identifier</a:t>
+            </a:r>
+          </a:p>
+          <a:p>
+            <a:pPr marL="91440" indent="0">
+              <a:spcBef>
+                <a:spcPts val="100"/>
+              </a:spcBef>
+              <a:buFontTx/>
+              <a:buNone/>
+            </a:pPr>
+            <a:r>
+              <a:rPr lang="en-US" sz="1800" dirty="0">
+                <a:latin typeface="Consolas" pitchFamily="49" charset="0"/>
+              </a:rPr>
+              <a:t>             || symbol == Symbol.intLiteral</a:t>
+            </a:r>
+          </a:p>
+          <a:p>
+            <a:pPr marL="91440" indent="0">
+              <a:spcBef>
+                <a:spcPts val="100"/>
+              </a:spcBef>
+              <a:buFontTx/>
+              <a:buNone/>
+            </a:pPr>
+            <a:r>
+              <a:rPr lang="en-US" sz="1800" dirty="0">
+                <a:latin typeface="Consolas" pitchFamily="49" charset="0"/>
+              </a:rPr>
+              <a:t>             || symbol == Symbol.stringLiteral</a:t>
+            </a:r>
+          </a:p>
+          <a:p>
+            <a:pPr marL="91440" indent="0">
+              <a:spcBef>
+                <a:spcPts val="100"/>
+              </a:spcBef>
+              <a:buFontTx/>
+              <a:buNone/>
+            </a:pPr>
+            <a:r>
+              <a:rPr lang="en-US" sz="1800" dirty="0">
+                <a:latin typeface="Consolas" pitchFamily="49" charset="0"/>
+              </a:rPr>
+              <a:t>             || symbol == Symbol.charLiteral)</a:t>
+            </a:r>
+          </a:p>
+          <a:p>
+            <a:pPr marL="91440" indent="0">
+              <a:spcBef>
+                <a:spcPts val="100"/>
+              </a:spcBef>
+              <a:buFontTx/>
+              <a:buNone/>
+            </a:pPr>
+            <a:r>
+              <a:rPr lang="en-US" sz="1800" dirty="0">
+                <a:latin typeface="Consolas" pitchFamily="49" charset="0"/>
+              </a:rPr>
+              <a:t>        </a:t>
+            </a:r>
+            <a:r>
+              <a:rPr lang="en-US" sz="1800" dirty="0" err="1">
+                <a:latin typeface="Consolas" pitchFamily="49" charset="0"/>
+              </a:rPr>
+              <a:t>System.out.print</a:t>
+            </a:r>
+            <a:r>
+              <a:rPr lang="en-US" sz="1800" dirty="0">
+                <a:latin typeface="Consolas" pitchFamily="49" charset="0"/>
+              </a:rPr>
+              <a:t>(token.getSymbol().toString() + " -&gt; ");</a:t>
+            </a:r>
+          </a:p>
+          <a:p>
+            <a:pPr marL="91440" indent="0">
+              <a:spcBef>
+                <a:spcPts val="100"/>
+              </a:spcBef>
+              <a:buFontTx/>
+              <a:buNone/>
+            </a:pPr>
             <a:endParaRPr lang="en-US" sz="1800" dirty="0">
               <a:latin typeface="Consolas" pitchFamily="49" charset="0"/>
             </a:endParaRPr>
@@ -12713,29 +12785,20 @@
               <a:rPr lang="en-US" sz="1800" dirty="0">
                 <a:latin typeface="Consolas" pitchFamily="49" charset="0"/>
               </a:rPr>
-              <a:t>        || </a:t>
+              <a:t>    </a:t>
             </a:r>
             <a:r>
               <a:rPr lang="en-US" sz="1800" dirty="0" err="1">
                 <a:latin typeface="Consolas" pitchFamily="49" charset="0"/>
               </a:rPr>
-              <a:t>token.getSymbol</a:t>
-            </a:r>
-            <a:r>
-              <a:rPr lang="en-US" sz="1800" dirty="0">
-                <a:latin typeface="Consolas" pitchFamily="49" charset="0"/>
-              </a:rPr>
-              <a:t>() == </a:t>
-            </a:r>
-            <a:r>
-              <a:rPr lang="en-US" sz="1800" dirty="0" err="1">
-                <a:latin typeface="Consolas" pitchFamily="49" charset="0"/>
-              </a:rPr>
-              <a:t>Symbol.stringLiteral</a:t>
-            </a:r>
-            <a:endParaRPr lang="en-US" sz="1800" dirty="0">
-              <a:latin typeface="Consolas" pitchFamily="49" charset="0"/>
-            </a:endParaRPr>
+              <a:t>System.out.println</a:t>
+            </a:r>
+            <a:r>
+              <a:rPr lang="en-US" sz="1800" dirty="0">
+                <a:latin typeface="Consolas" pitchFamily="49" charset="0"/>
+              </a:rPr>
+              <a:t>(token.getText());</a:t>
+            </a:r>
           </a:p>
           <a:p>
             <a:pPr marL="91440" indent="0">
@@ -12749,121 +12812,7 @@
               <a:rPr lang="en-US" sz="1800" dirty="0">
                 <a:latin typeface="Consolas" pitchFamily="49" charset="0"/>
               </a:rPr>
-              <a:t>        || </a:t>
-            </a:r>
-            <a:r>
-              <a:rPr lang="en-US" sz="1800" dirty="0" err="1">
-                <a:latin typeface="Consolas" pitchFamily="49" charset="0"/>
-              </a:rPr>
-              <a:t>token.getSymbol</a:t>
-            </a:r>
-            <a:r>
-              <a:rPr lang="en-US" sz="1800" dirty="0">
-                <a:latin typeface="Consolas" pitchFamily="49" charset="0"/>
-              </a:rPr>
-              <a:t>() == </a:t>
-            </a:r>
-            <a:r>
-              <a:rPr lang="en-US" sz="1800" dirty="0" err="1">
-                <a:latin typeface="Consolas" pitchFamily="49" charset="0"/>
-              </a:rPr>
-              <a:t>Symbol.charLiteral</a:t>
-            </a:r>
-            <a:r>
-              <a:rPr lang="en-US" sz="1800" dirty="0">
-                <a:latin typeface="Consolas" pitchFamily="49" charset="0"/>
-              </a:rPr>
-              <a:t>)</a:t>
-            </a:r>
-          </a:p>
-          <a:p>
-            <a:pPr marL="91440" indent="0">
-              <a:spcBef>
-                <a:spcPts val="100"/>
-              </a:spcBef>
-              <a:buFontTx/>
-              <a:buNone/>
-            </a:pPr>
-            <a:r>
-              <a:rPr lang="en-US" sz="1800" dirty="0">
-                <a:latin typeface="Consolas" pitchFamily="49" charset="0"/>
-              </a:rPr>
-              <a:t>        </a:t>
-            </a:r>
-            <a:r>
-              <a:rPr lang="en-US" sz="1800" dirty="0" err="1">
-                <a:latin typeface="Consolas" pitchFamily="49" charset="0"/>
-              </a:rPr>
-              <a:t>System.out.print</a:t>
-            </a:r>
-            <a:r>
-              <a:rPr lang="en-US" sz="1800" dirty="0">
-                <a:latin typeface="Consolas" pitchFamily="49" charset="0"/>
-              </a:rPr>
-              <a:t>(</a:t>
-            </a:r>
-            <a:r>
-              <a:rPr lang="en-US" sz="1800" dirty="0" err="1">
-                <a:latin typeface="Consolas" pitchFamily="49" charset="0"/>
-              </a:rPr>
-              <a:t>token.getSymbol</a:t>
-            </a:r>
-            <a:r>
-              <a:rPr lang="en-US" sz="1800" dirty="0">
-                <a:latin typeface="Consolas" pitchFamily="49" charset="0"/>
-              </a:rPr>
-              <a:t>().</a:t>
-            </a:r>
-            <a:r>
-              <a:rPr lang="en-US" sz="1800" dirty="0" err="1">
-                <a:latin typeface="Consolas" pitchFamily="49" charset="0"/>
-              </a:rPr>
-              <a:t>toString</a:t>
-            </a:r>
-            <a:r>
-              <a:rPr lang="en-US" sz="1800" dirty="0">
-                <a:latin typeface="Consolas" pitchFamily="49" charset="0"/>
-              </a:rPr>
-              <a:t>() + " -&gt; ");</a:t>
-            </a:r>
-          </a:p>
-          <a:p>
-            <a:pPr marL="91440" indent="0">
-              <a:spcBef>
-                <a:spcPts val="100"/>
-              </a:spcBef>
-              <a:buFontTx/>
-              <a:buNone/>
-            </a:pPr>
-            <a:r>
-              <a:rPr lang="en-US" sz="1800" dirty="0">
-                <a:latin typeface="Consolas" pitchFamily="49" charset="0"/>
-              </a:rPr>
-              <a:t>    </a:t>
-            </a:r>
-            <a:r>
-              <a:rPr lang="en-US" sz="1800" dirty="0" err="1">
-                <a:latin typeface="Consolas" pitchFamily="49" charset="0"/>
-              </a:rPr>
-              <a:t>System.out.println</a:t>
-            </a:r>
-            <a:r>
-              <a:rPr lang="en-US" sz="1800" dirty="0">
-                <a:latin typeface="Consolas" pitchFamily="49" charset="0"/>
-              </a:rPr>
-              <a:t>(</a:t>
-            </a:r>
-            <a:r>
-              <a:rPr lang="en-US" sz="1800" dirty="0" err="1">
-                <a:latin typeface="Consolas" pitchFamily="49" charset="0"/>
-              </a:rPr>
-              <a:t>token.getText</a:t>
-            </a:r>
-            <a:r>
-              <a:rPr lang="en-US" sz="1800" dirty="0">
-                <a:latin typeface="Consolas" pitchFamily="49" charset="0"/>
-              </a:rPr>
-              <a:t>());</a:t>
+              <a:t>  }</a:t>
             </a:r>
           </a:p>
         </p:txBody>
@@ -13000,15 +12949,7 @@
             </a:r>
             <a:r>
               <a:rPr lang="en-US" sz="2400" dirty="0"/>
-              <a:t> in </a:t>
-            </a:r>
-            <a:r>
-              <a:rPr lang="en-US" sz="2400" dirty="0" err="1"/>
-              <a:t>ScannerTests</a:t>
-            </a:r>
-            <a:r>
-              <a:rPr lang="en-US" sz="2400" dirty="0"/>
-              <a:t>)</a:t>
+              <a:t> in ScannerTests)</a:t>
             </a:r>
           </a:p>
         </p:txBody>
@@ -13039,7 +12980,7 @@
               <a:rPr lang="en-US" sz="1800" dirty="0">
                 <a:latin typeface="Consolas" pitchFamily="49" charset="0"/>
               </a:rPr>
-              <a:t>line:  2   char:  1   token: and</a:t>
+              <a:t>line:  2   char:  1   token: Reserved Word -&gt; and</a:t>
             </a:r>
           </a:p>
           <a:p>
@@ -13054,7 +12995,7 @@
               <a:rPr lang="en-US" sz="1800" dirty="0">
                 <a:latin typeface="Consolas" pitchFamily="49" charset="0"/>
               </a:rPr>
-              <a:t>line:  2   char: 11   token: array</a:t>
+              <a:t>line:  2   char: 11   token: Reserved Word -&gt; array</a:t>
             </a:r>
           </a:p>
           <a:p>
@@ -13069,7 +13010,7 @@
               <a:rPr lang="en-US" sz="1800" dirty="0">
                 <a:latin typeface="Consolas" pitchFamily="49" charset="0"/>
               </a:rPr>
-              <a:t>line:  2   char: 21   token: begin</a:t>
+              <a:t>line:  2   char: 21   token: Reserved Word -&gt; begin</a:t>
             </a:r>
           </a:p>
           <a:p>
@@ -13084,7 +13025,7 @@
               <a:rPr lang="en-US" sz="1800" dirty="0">
                 <a:latin typeface="Consolas" pitchFamily="49" charset="0"/>
               </a:rPr>
-              <a:t>line:  2   char: 31   token: Boolean</a:t>
+              <a:t>line:  2   char: 31   token: Reserved Word -&gt; Boolean</a:t>
             </a:r>
           </a:p>
           <a:p>
@@ -13114,7 +13055,7 @@
               <a:rPr lang="en-US" sz="1800" dirty="0">
                 <a:latin typeface="Consolas" pitchFamily="49" charset="0"/>
               </a:rPr>
-              <a:t>line:  9   char: 31   token: while</a:t>
+              <a:t>line:  9   char: 31   token: Reserved Word -&gt; while</a:t>
             </a:r>
           </a:p>
           <a:p>
@@ -13129,7 +13070,7 @@
               <a:rPr lang="en-US" sz="1800" dirty="0">
                 <a:latin typeface="Consolas" pitchFamily="49" charset="0"/>
               </a:rPr>
-              <a:t>line:  9   char: 41   token: write</a:t>
+              <a:t>line:  9   char: 41   token: Reserved Word -&gt; write</a:t>
             </a:r>
           </a:p>
           <a:p>
@@ -13144,17 +13085,8 @@
               <a:rPr lang="en-US" sz="1800" dirty="0">
                 <a:latin typeface="Consolas" pitchFamily="49" charset="0"/>
               </a:rPr>
-              <a:t>line: 10   char:  1   token: </a:t>
-            </a:r>
-            <a:r>
-              <a:rPr lang="en-US" sz="1800" dirty="0" err="1">
-                <a:latin typeface="Consolas" pitchFamily="49" charset="0"/>
-              </a:rPr>
-              <a:t>writeln</a:t>
-            </a:r>
-            <a:endParaRPr lang="en-US" sz="1800" dirty="0">
-              <a:latin typeface="Consolas" pitchFamily="49" charset="0"/>
-            </a:endParaRPr>
+              <a:t>line: 10   char:  1   token: Reserved Word -&gt; writeln</a:t>
+            </a:r>
           </a:p>
           <a:p>
             <a:pPr lvl="1">

</xml_diff>